<commit_message>
update the final version of codes and ppt by modifying the block diagram
</commit_message>
<xml_diff>
--- a/final/IoT_presentation_v2.pptx
+++ b/final/IoT_presentation_v2.pptx
@@ -297,7 +297,7 @@
       </p15:sldGuideLst>
     </p:ext>
     <p:ext uri="http://customooxmlschemas.google.com/">
-      <go:slidesCustomData xmlns:go="http://customooxmlschemas.google.com/" r:id="rId40" roundtripDataSignature="AMtx7mjEicrfevlt2ustnkawWtfCcPRDFA=="/>
+      <go:slidesCustomData xmlns:go="http://customooxmlschemas.google.com/" r:id="rId40" roundtripDataSignature="AMtx7mg3VczsFeG/yp0nHzKfPzVuAhuZeA=="/>
     </p:ext>
   </p:extLst>
 </p:presentation>
@@ -1905,7 +1905,7 @@
   <p:cSld>
     <p:spTree>
       <p:nvGrpSpPr>
-        <p:cNvPr id="190" name="Shape 190"/>
+        <p:cNvPr id="188" name="Shape 188"/>
         <p:cNvGrpSpPr/>
         <p:nvPr/>
       </p:nvGrpSpPr>
@@ -1919,7 +1919,7 @@
       </p:grpSpPr>
       <p:sp>
         <p:nvSpPr>
-          <p:cNvPr id="191" name="Google Shape;191;gad8afea2a7_0_27:notes"/>
+          <p:cNvPr id="189" name="Google Shape;189;gad8afea2a7_0_18:notes"/>
           <p:cNvSpPr/>
           <p:nvPr>
             <p:ph idx="2" type="sldImg"/>
@@ -1964,7 +1964,7 @@
       </p:sp>
       <p:sp>
         <p:nvSpPr>
-          <p:cNvPr id="192" name="Google Shape;192;gad8afea2a7_0_27:notes"/>
+          <p:cNvPr id="190" name="Google Shape;190;gad8afea2a7_0_18:notes"/>
           <p:cNvSpPr txBox="1"/>
           <p:nvPr>
             <p:ph idx="1" type="body"/>
@@ -2011,7 +2011,7 @@
       </p:sp>
       <p:sp>
         <p:nvSpPr>
-          <p:cNvPr id="193" name="Google Shape;193;gad8afea2a7_0_27:notes"/>
+          <p:cNvPr id="191" name="Google Shape;191;gad8afea2a7_0_18:notes"/>
           <p:cNvSpPr txBox="1"/>
           <p:nvPr>
             <p:ph idx="12" type="sldNum"/>
@@ -2070,7 +2070,7 @@
   <p:cSld>
     <p:spTree>
       <p:nvGrpSpPr>
-        <p:cNvPr id="197" name="Shape 197"/>
+        <p:cNvPr id="195" name="Shape 195"/>
         <p:cNvGrpSpPr/>
         <p:nvPr/>
       </p:nvGrpSpPr>
@@ -2084,7 +2084,7 @@
       </p:grpSpPr>
       <p:sp>
         <p:nvSpPr>
-          <p:cNvPr id="198" name="Google Shape;198;gad8afea2a7_5_1:notes"/>
+          <p:cNvPr id="196" name="Google Shape;196;gaf56e44d72_0_15:notes"/>
           <p:cNvSpPr/>
           <p:nvPr>
             <p:ph idx="2" type="sldImg"/>
@@ -2129,7 +2129,7 @@
       </p:sp>
       <p:sp>
         <p:nvSpPr>
-          <p:cNvPr id="199" name="Google Shape;199;gad8afea2a7_5_1:notes"/>
+          <p:cNvPr id="197" name="Google Shape;197;gaf56e44d72_0_15:notes"/>
           <p:cNvSpPr txBox="1"/>
           <p:nvPr>
             <p:ph idx="1" type="body"/>
@@ -2176,7 +2176,7 @@
       </p:sp>
       <p:sp>
         <p:nvSpPr>
-          <p:cNvPr id="200" name="Google Shape;200;gad8afea2a7_5_1:notes"/>
+          <p:cNvPr id="198" name="Google Shape;198;gaf56e44d72_0_15:notes"/>
           <p:cNvSpPr txBox="1"/>
           <p:nvPr>
             <p:ph idx="12" type="sldNum"/>
@@ -2235,7 +2235,7 @@
   <p:cSld>
     <p:spTree>
       <p:nvGrpSpPr>
-        <p:cNvPr id="206" name="Shape 206"/>
+        <p:cNvPr id="202" name="Shape 202"/>
         <p:cNvGrpSpPr/>
         <p:nvPr/>
       </p:nvGrpSpPr>
@@ -2249,7 +2249,7 @@
       </p:grpSpPr>
       <p:sp>
         <p:nvSpPr>
-          <p:cNvPr id="207" name="Google Shape;207;p14:notes"/>
+          <p:cNvPr id="203" name="Google Shape;203;p14:notes"/>
           <p:cNvSpPr txBox="1"/>
           <p:nvPr>
             <p:ph idx="1" type="body"/>
@@ -2297,7 +2297,7 @@
       </p:sp>
       <p:sp>
         <p:nvSpPr>
-          <p:cNvPr id="208" name="Google Shape;208;p14:notes"/>
+          <p:cNvPr id="204" name="Google Shape;204;p14:notes"/>
           <p:cNvSpPr/>
           <p:nvPr>
             <p:ph idx="2" type="sldImg"/>
@@ -2353,7 +2353,7 @@
   <p:cSld>
     <p:spTree>
       <p:nvGrpSpPr>
-        <p:cNvPr id="219" name="Shape 219"/>
+        <p:cNvPr id="215" name="Shape 215"/>
         <p:cNvGrpSpPr/>
         <p:nvPr/>
       </p:nvGrpSpPr>
@@ -2367,7 +2367,7 @@
       </p:grpSpPr>
       <p:sp>
         <p:nvSpPr>
-          <p:cNvPr id="220" name="Google Shape;220;gad8afea2a7_1_0:notes"/>
+          <p:cNvPr id="216" name="Google Shape;216;gad8afea2a7_1_0:notes"/>
           <p:cNvSpPr/>
           <p:nvPr>
             <p:ph idx="2" type="sldImg"/>
@@ -2412,7 +2412,7 @@
       </p:sp>
       <p:sp>
         <p:nvSpPr>
-          <p:cNvPr id="221" name="Google Shape;221;gad8afea2a7_1_0:notes"/>
+          <p:cNvPr id="217" name="Google Shape;217;gad8afea2a7_1_0:notes"/>
           <p:cNvSpPr txBox="1"/>
           <p:nvPr>
             <p:ph idx="1" type="body"/>
@@ -2459,7 +2459,7 @@
       </p:sp>
       <p:sp>
         <p:nvSpPr>
-          <p:cNvPr id="222" name="Google Shape;222;gad8afea2a7_1_0:notes"/>
+          <p:cNvPr id="218" name="Google Shape;218;gad8afea2a7_1_0:notes"/>
           <p:cNvSpPr txBox="1"/>
           <p:nvPr>
             <p:ph idx="12" type="sldNum"/>
@@ -2522,7 +2522,7 @@
   <p:cSld>
     <p:spTree>
       <p:nvGrpSpPr>
-        <p:cNvPr id="232" name="Shape 232"/>
+        <p:cNvPr id="228" name="Shape 228"/>
         <p:cNvGrpSpPr/>
         <p:nvPr/>
       </p:nvGrpSpPr>
@@ -2536,7 +2536,7 @@
       </p:grpSpPr>
       <p:sp>
         <p:nvSpPr>
-          <p:cNvPr id="233" name="Google Shape;233;gadbe60d9e0_0_9:notes"/>
+          <p:cNvPr id="229" name="Google Shape;229;gadbe60d9e0_0_9:notes"/>
           <p:cNvSpPr txBox="1"/>
           <p:nvPr>
             <p:ph idx="1" type="body"/>
@@ -2584,7 +2584,7 @@
       </p:sp>
       <p:sp>
         <p:nvSpPr>
-          <p:cNvPr id="234" name="Google Shape;234;gadbe60d9e0_0_9:notes"/>
+          <p:cNvPr id="230" name="Google Shape;230;gadbe60d9e0_0_9:notes"/>
           <p:cNvSpPr/>
           <p:nvPr>
             <p:ph idx="2" type="sldImg"/>
@@ -2640,7 +2640,7 @@
   <p:cSld>
     <p:spTree>
       <p:nvGrpSpPr>
-        <p:cNvPr id="255" name="Shape 255"/>
+        <p:cNvPr id="251" name="Shape 251"/>
         <p:cNvGrpSpPr/>
         <p:nvPr/>
       </p:nvGrpSpPr>
@@ -2654,7 +2654,7 @@
       </p:grpSpPr>
       <p:sp>
         <p:nvSpPr>
-          <p:cNvPr id="256" name="Google Shape;256;gad8afea2a7_5_35:notes"/>
+          <p:cNvPr id="252" name="Google Shape;252;gad8afea2a7_5_35:notes"/>
           <p:cNvSpPr txBox="1"/>
           <p:nvPr>
             <p:ph idx="1" type="body"/>
@@ -2702,7 +2702,7 @@
       </p:sp>
       <p:sp>
         <p:nvSpPr>
-          <p:cNvPr id="257" name="Google Shape;257;gad8afea2a7_5_35:notes"/>
+          <p:cNvPr id="253" name="Google Shape;253;gad8afea2a7_5_35:notes"/>
           <p:cNvSpPr/>
           <p:nvPr>
             <p:ph idx="2" type="sldImg"/>
@@ -2758,7 +2758,7 @@
   <p:cSld>
     <p:spTree>
       <p:nvGrpSpPr>
-        <p:cNvPr id="282" name="Shape 282"/>
+        <p:cNvPr id="278" name="Shape 278"/>
         <p:cNvGrpSpPr/>
         <p:nvPr/>
       </p:nvGrpSpPr>
@@ -2772,7 +2772,7 @@
       </p:grpSpPr>
       <p:sp>
         <p:nvSpPr>
-          <p:cNvPr id="283" name="Google Shape;283;ga57c1fc9d1_0_13:notes"/>
+          <p:cNvPr id="279" name="Google Shape;279;ga57c1fc9d1_0_13:notes"/>
           <p:cNvSpPr txBox="1"/>
           <p:nvPr>
             <p:ph idx="1" type="body"/>
@@ -2820,7 +2820,7 @@
       </p:sp>
       <p:sp>
         <p:nvSpPr>
-          <p:cNvPr id="284" name="Google Shape;284;ga57c1fc9d1_0_13:notes"/>
+          <p:cNvPr id="280" name="Google Shape;280;ga57c1fc9d1_0_13:notes"/>
           <p:cNvSpPr/>
           <p:nvPr>
             <p:ph idx="2" type="sldImg"/>
@@ -2876,7 +2876,7 @@
   <p:cSld>
     <p:spTree>
       <p:nvGrpSpPr>
-        <p:cNvPr id="289" name="Shape 289"/>
+        <p:cNvPr id="285" name="Shape 285"/>
         <p:cNvGrpSpPr/>
         <p:nvPr/>
       </p:nvGrpSpPr>
@@ -2890,7 +2890,7 @@
       </p:grpSpPr>
       <p:sp>
         <p:nvSpPr>
-          <p:cNvPr id="290" name="Google Shape;290;gad8afea2a7_5_95:notes"/>
+          <p:cNvPr id="286" name="Google Shape;286;gad8afea2a7_5_95:notes"/>
           <p:cNvSpPr txBox="1"/>
           <p:nvPr>
             <p:ph idx="1" type="body"/>
@@ -2938,7 +2938,7 @@
       </p:sp>
       <p:sp>
         <p:nvSpPr>
-          <p:cNvPr id="291" name="Google Shape;291;gad8afea2a7_5_95:notes"/>
+          <p:cNvPr id="287" name="Google Shape;287;gad8afea2a7_5_95:notes"/>
           <p:cNvSpPr/>
           <p:nvPr>
             <p:ph idx="2" type="sldImg"/>
@@ -2994,7 +2994,7 @@
   <p:cSld>
     <p:spTree>
       <p:nvGrpSpPr>
-        <p:cNvPr id="311" name="Shape 311"/>
+        <p:cNvPr id="307" name="Shape 307"/>
         <p:cNvGrpSpPr/>
         <p:nvPr/>
       </p:nvGrpSpPr>
@@ -3008,7 +3008,7 @@
       </p:grpSpPr>
       <p:sp>
         <p:nvSpPr>
-          <p:cNvPr id="312" name="Google Shape;312;gad8afea2a7_5_72:notes"/>
+          <p:cNvPr id="308" name="Google Shape;308;gad8afea2a7_5_72:notes"/>
           <p:cNvSpPr txBox="1"/>
           <p:nvPr>
             <p:ph idx="1" type="body"/>
@@ -3056,7 +3056,7 @@
       </p:sp>
       <p:sp>
         <p:nvSpPr>
-          <p:cNvPr id="313" name="Google Shape;313;gad8afea2a7_5_72:notes"/>
+          <p:cNvPr id="309" name="Google Shape;309;gad8afea2a7_5_72:notes"/>
           <p:cNvSpPr/>
           <p:nvPr>
             <p:ph idx="2" type="sldImg"/>
@@ -3112,7 +3112,7 @@
   <p:cSld>
     <p:spTree>
       <p:nvGrpSpPr>
-        <p:cNvPr id="328" name="Shape 328"/>
+        <p:cNvPr id="324" name="Shape 324"/>
         <p:cNvGrpSpPr/>
         <p:nvPr/>
       </p:nvGrpSpPr>
@@ -3126,7 +3126,7 @@
       </p:grpSpPr>
       <p:sp>
         <p:nvSpPr>
-          <p:cNvPr id="329" name="Google Shape;329;gad8afea2a7_4_0:notes"/>
+          <p:cNvPr id="325" name="Google Shape;325;gad8afea2a7_4_0:notes"/>
           <p:cNvSpPr/>
           <p:nvPr>
             <p:ph idx="2" type="sldImg"/>
@@ -3171,7 +3171,7 @@
       </p:sp>
       <p:sp>
         <p:nvSpPr>
-          <p:cNvPr id="330" name="Google Shape;330;gad8afea2a7_4_0:notes"/>
+          <p:cNvPr id="326" name="Google Shape;326;gad8afea2a7_4_0:notes"/>
           <p:cNvSpPr txBox="1"/>
           <p:nvPr>
             <p:ph idx="1" type="body"/>
@@ -3218,7 +3218,7 @@
       </p:sp>
       <p:sp>
         <p:nvSpPr>
-          <p:cNvPr id="331" name="Google Shape;331;gad8afea2a7_4_0:notes"/>
+          <p:cNvPr id="327" name="Google Shape;327;gad8afea2a7_4_0:notes"/>
           <p:cNvSpPr txBox="1"/>
           <p:nvPr>
             <p:ph idx="12" type="sldNum"/>
@@ -3450,7 +3450,7 @@
   <p:cSld>
     <p:spTree>
       <p:nvGrpSpPr>
-        <p:cNvPr id="346" name="Shape 346"/>
+        <p:cNvPr id="342" name="Shape 342"/>
         <p:cNvGrpSpPr/>
         <p:nvPr/>
       </p:nvGrpSpPr>
@@ -3464,151 +3464,7 @@
       </p:grpSpPr>
       <p:sp>
         <p:nvSpPr>
-          <p:cNvPr id="347" name="Google Shape;347;gaf59b23b9b_2_0:notes"/>
-          <p:cNvSpPr/>
-          <p:nvPr>
-            <p:ph idx="2" type="sldImg"/>
-          </p:nvPr>
-        </p:nvSpPr>
-        <p:spPr>
-          <a:xfrm>
-            <a:off x="1200150" y="1143000"/>
-            <a:ext cx="4457700" cy="3086100"/>
-          </a:xfrm>
-          <a:custGeom>
-            <a:rect b="b" l="l" r="r" t="t"/>
-            <a:pathLst>
-              <a:path extrusionOk="0" h="120000" w="120000">
-                <a:moveTo>
-                  <a:pt x="0" y="0"/>
-                </a:moveTo>
-                <a:lnTo>
-                  <a:pt x="120000" y="0"/>
-                </a:lnTo>
-                <a:lnTo>
-                  <a:pt x="120000" y="120000"/>
-                </a:lnTo>
-                <a:lnTo>
-                  <a:pt x="0" y="120000"/>
-                </a:lnTo>
-                <a:close/>
-              </a:path>
-            </a:pathLst>
-          </a:custGeom>
-        </p:spPr>
-      </p:sp>
-      <p:sp>
-        <p:nvSpPr>
-          <p:cNvPr id="348" name="Google Shape;348;gaf59b23b9b_2_0:notes"/>
-          <p:cNvSpPr txBox="1"/>
-          <p:nvPr>
-            <p:ph idx="1" type="body"/>
-          </p:nvPr>
-        </p:nvSpPr>
-        <p:spPr>
-          <a:xfrm>
-            <a:off x="685800" y="4400550"/>
-            <a:ext cx="5486400" cy="3600600"/>
-          </a:xfrm>
-          <a:prstGeom prst="rect">
-            <a:avLst/>
-          </a:prstGeom>
-        </p:spPr>
-        <p:txBody>
-          <a:bodyPr anchorCtr="0" anchor="t" bIns="91425" lIns="91425" spcFirstLastPara="1" rIns="91425" wrap="square" tIns="91425">
-            <a:noAutofit/>
-          </a:bodyPr>
-          <a:lstStyle/>
-          <a:p>
-            <a:pPr indent="0" lvl="0" marL="0" rtl="0" algn="l">
-              <a:spcBef>
-                <a:spcPts val="0"/>
-              </a:spcBef>
-              <a:spcAft>
-                <a:spcPts val="0"/>
-              </a:spcAft>
-              <a:buNone/>
-            </a:pPr>
-            <a:r>
-              <a:t/>
-            </a:r>
-            <a:endParaRPr/>
-          </a:p>
-        </p:txBody>
-      </p:sp>
-      <p:sp>
-        <p:nvSpPr>
-          <p:cNvPr id="349" name="Google Shape;349;gaf59b23b9b_2_0:notes"/>
-          <p:cNvSpPr txBox="1"/>
-          <p:nvPr>
-            <p:ph idx="12" type="sldNum"/>
-          </p:nvPr>
-        </p:nvSpPr>
-        <p:spPr>
-          <a:xfrm>
-            <a:off x="3884613" y="8685213"/>
-            <a:ext cx="2971800" cy="458700"/>
-          </a:xfrm>
-          <a:prstGeom prst="rect">
-            <a:avLst/>
-          </a:prstGeom>
-        </p:spPr>
-        <p:txBody>
-          <a:bodyPr anchorCtr="0" anchor="b" bIns="45700" lIns="91425" spcFirstLastPara="1" rIns="91425" wrap="square" tIns="45700">
-            <a:noAutofit/>
-          </a:bodyPr>
-          <a:lstStyle/>
-          <a:p>
-            <a:pPr indent="0" lvl="0" marL="0" rtl="0" algn="r">
-              <a:spcBef>
-                <a:spcPts val="0"/>
-              </a:spcBef>
-              <a:spcAft>
-                <a:spcPts val="0"/>
-              </a:spcAft>
-              <a:buClr>
-                <a:srgbClr val="000000"/>
-              </a:buClr>
-              <a:buSzPts val="1200"/>
-              <a:buFont typeface="Arial"/>
-              <a:buNone/>
-            </a:pPr>
-            <a:fld id="{00000000-1234-1234-1234-123412341234}" type="slidenum">
-              <a:rPr lang="en-US"/>
-              <a:t>‹#›</a:t>
-            </a:fld>
-            <a:endParaRPr/>
-          </a:p>
-        </p:txBody>
-      </p:sp>
-    </p:spTree>
-  </p:cSld>
-  <p:clrMapOvr>
-    <a:masterClrMapping/>
-  </p:clrMapOvr>
-</p:notes>
-</file>
-
-<file path=ppt/notesSlides/notesSlide21.xml><?xml version="1.0" encoding="utf-8"?>
-<p:notes xmlns:a="http://schemas.openxmlformats.org/drawingml/2006/main" xmlns:r="http://schemas.openxmlformats.org/officeDocument/2006/relationships" xmlns:mc="http://schemas.openxmlformats.org/markup-compatibility/2006" xmlns:mv="urn:schemas-microsoft-com:mac:vml" xmlns:p="http://schemas.openxmlformats.org/presentationml/2006/main" xmlns:c="http://schemas.openxmlformats.org/drawingml/2006/chart" xmlns:dgm="http://schemas.openxmlformats.org/drawingml/2006/diagram" xmlns:o="urn:schemas-microsoft-com:office:office" xmlns:v="urn:schemas-microsoft-com:vml" xmlns:pvml="urn:schemas-microsoft-com:office:powerpoint" xmlns:com="http://schemas.openxmlformats.org/drawingml/2006/compatibility" xmlns:p14="http://schemas.microsoft.com/office/powerpoint/2010/main" xmlns:p15="http://schemas.microsoft.com/office/powerpoint/2012/main" xmlns:ahyp="http://schemas.microsoft.com/office/drawing/2018/hyperlinkcolor" showMasterPhAnim="0" showMasterSp="0">
-  <p:cSld>
-    <p:spTree>
-      <p:nvGrpSpPr>
-        <p:cNvPr id="355" name="Shape 355"/>
-        <p:cNvGrpSpPr/>
-        <p:nvPr/>
-      </p:nvGrpSpPr>
-      <p:grpSpPr>
-        <a:xfrm>
-          <a:off x="0" y="0"/>
-          <a:ext cx="0" cy="0"/>
-          <a:chOff x="0" y="0"/>
-          <a:chExt cx="0" cy="0"/>
-        </a:xfrm>
-      </p:grpSpPr>
-      <p:sp>
-        <p:nvSpPr>
-          <p:cNvPr id="356" name="Google Shape;356;gad8afea2a7_3_0:notes"/>
+          <p:cNvPr id="343" name="Google Shape;343;gaf59b23b9b_2_0:notes"/>
           <p:cNvSpPr/>
           <p:nvPr>
             <p:ph idx="2" type="sldImg"/>
@@ -3653,7 +3509,7 @@
       </p:sp>
       <p:sp>
         <p:nvSpPr>
-          <p:cNvPr id="357" name="Google Shape;357;gad8afea2a7_3_0:notes"/>
+          <p:cNvPr id="344" name="Google Shape;344;gaf59b23b9b_2_0:notes"/>
           <p:cNvSpPr txBox="1"/>
           <p:nvPr>
             <p:ph idx="1" type="body"/>
@@ -3700,7 +3556,7 @@
       </p:sp>
       <p:sp>
         <p:nvSpPr>
-          <p:cNvPr id="358" name="Google Shape;358;gad8afea2a7_3_0:notes"/>
+          <p:cNvPr id="345" name="Google Shape;345;gaf59b23b9b_2_0:notes"/>
           <p:cNvSpPr txBox="1"/>
           <p:nvPr>
             <p:ph idx="12" type="sldNum"/>
@@ -3758,12 +3614,12 @@
 </p:notes>
 </file>
 
-<file path=ppt/notesSlides/notesSlide22.xml><?xml version="1.0" encoding="utf-8"?>
+<file path=ppt/notesSlides/notesSlide21.xml><?xml version="1.0" encoding="utf-8"?>
 <p:notes xmlns:a="http://schemas.openxmlformats.org/drawingml/2006/main" xmlns:r="http://schemas.openxmlformats.org/officeDocument/2006/relationships" xmlns:mc="http://schemas.openxmlformats.org/markup-compatibility/2006" xmlns:mv="urn:schemas-microsoft-com:mac:vml" xmlns:p="http://schemas.openxmlformats.org/presentationml/2006/main" xmlns:c="http://schemas.openxmlformats.org/drawingml/2006/chart" xmlns:dgm="http://schemas.openxmlformats.org/drawingml/2006/diagram" xmlns:o="urn:schemas-microsoft-com:office:office" xmlns:v="urn:schemas-microsoft-com:vml" xmlns:pvml="urn:schemas-microsoft-com:office:powerpoint" xmlns:com="http://schemas.openxmlformats.org/drawingml/2006/compatibility" xmlns:p14="http://schemas.microsoft.com/office/powerpoint/2010/main" xmlns:p15="http://schemas.microsoft.com/office/powerpoint/2012/main" xmlns:ahyp="http://schemas.microsoft.com/office/drawing/2018/hyperlinkcolor" showMasterPhAnim="0" showMasterSp="0">
   <p:cSld>
     <p:spTree>
       <p:nvGrpSpPr>
-        <p:cNvPr id="362" name="Shape 362"/>
+        <p:cNvPr id="351" name="Shape 351"/>
         <p:cNvGrpSpPr/>
         <p:nvPr/>
       </p:nvGrpSpPr>
@@ -3777,7 +3633,7 @@
       </p:grpSpPr>
       <p:sp>
         <p:nvSpPr>
-          <p:cNvPr id="363" name="Google Shape;363;gad8afea2a7_3_13:notes"/>
+          <p:cNvPr id="352" name="Google Shape;352;gad8afea2a7_3_0:notes"/>
           <p:cNvSpPr/>
           <p:nvPr>
             <p:ph idx="2" type="sldImg"/>
@@ -3822,7 +3678,7 @@
       </p:sp>
       <p:sp>
         <p:nvSpPr>
-          <p:cNvPr id="364" name="Google Shape;364;gad8afea2a7_3_13:notes"/>
+          <p:cNvPr id="353" name="Google Shape;353;gad8afea2a7_3_0:notes"/>
           <p:cNvSpPr txBox="1"/>
           <p:nvPr>
             <p:ph idx="1" type="body"/>
@@ -3869,7 +3725,7 @@
       </p:sp>
       <p:sp>
         <p:nvSpPr>
-          <p:cNvPr id="365" name="Google Shape;365;gad8afea2a7_3_13:notes"/>
+          <p:cNvPr id="354" name="Google Shape;354;gad8afea2a7_3_0:notes"/>
           <p:cNvSpPr txBox="1"/>
           <p:nvPr>
             <p:ph idx="12" type="sldNum"/>
@@ -3927,12 +3783,12 @@
 </p:notes>
 </file>
 
-<file path=ppt/notesSlides/notesSlide23.xml><?xml version="1.0" encoding="utf-8"?>
+<file path=ppt/notesSlides/notesSlide22.xml><?xml version="1.0" encoding="utf-8"?>
 <p:notes xmlns:a="http://schemas.openxmlformats.org/drawingml/2006/main" xmlns:r="http://schemas.openxmlformats.org/officeDocument/2006/relationships" xmlns:mc="http://schemas.openxmlformats.org/markup-compatibility/2006" xmlns:mv="urn:schemas-microsoft-com:mac:vml" xmlns:p="http://schemas.openxmlformats.org/presentationml/2006/main" xmlns:c="http://schemas.openxmlformats.org/drawingml/2006/chart" xmlns:dgm="http://schemas.openxmlformats.org/drawingml/2006/diagram" xmlns:o="urn:schemas-microsoft-com:office:office" xmlns:v="urn:schemas-microsoft-com:vml" xmlns:pvml="urn:schemas-microsoft-com:office:powerpoint" xmlns:com="http://schemas.openxmlformats.org/drawingml/2006/compatibility" xmlns:p14="http://schemas.microsoft.com/office/powerpoint/2010/main" xmlns:p15="http://schemas.microsoft.com/office/powerpoint/2012/main" xmlns:ahyp="http://schemas.microsoft.com/office/drawing/2018/hyperlinkcolor" showMasterPhAnim="0" showMasterSp="0">
   <p:cSld>
     <p:spTree>
       <p:nvGrpSpPr>
-        <p:cNvPr id="369" name="Shape 369"/>
+        <p:cNvPr id="358" name="Shape 358"/>
         <p:cNvGrpSpPr/>
         <p:nvPr/>
       </p:nvGrpSpPr>
@@ -3946,7 +3802,7 @@
       </p:grpSpPr>
       <p:sp>
         <p:nvSpPr>
-          <p:cNvPr id="370" name="Google Shape;370;gad8afea2a7_3_26:notes"/>
+          <p:cNvPr id="359" name="Google Shape;359;gad8afea2a7_3_13:notes"/>
           <p:cNvSpPr/>
           <p:nvPr>
             <p:ph idx="2" type="sldImg"/>
@@ -3991,7 +3847,7 @@
       </p:sp>
       <p:sp>
         <p:nvSpPr>
-          <p:cNvPr id="371" name="Google Shape;371;gad8afea2a7_3_26:notes"/>
+          <p:cNvPr id="360" name="Google Shape;360;gad8afea2a7_3_13:notes"/>
           <p:cNvSpPr txBox="1"/>
           <p:nvPr>
             <p:ph idx="1" type="body"/>
@@ -4038,7 +3894,7 @@
       </p:sp>
       <p:sp>
         <p:nvSpPr>
-          <p:cNvPr id="372" name="Google Shape;372;gad8afea2a7_3_26:notes"/>
+          <p:cNvPr id="361" name="Google Shape;361;gad8afea2a7_3_13:notes"/>
           <p:cNvSpPr txBox="1"/>
           <p:nvPr>
             <p:ph idx="12" type="sldNum"/>
@@ -4096,12 +3952,12 @@
 </p:notes>
 </file>
 
-<file path=ppt/notesSlides/notesSlide24.xml><?xml version="1.0" encoding="utf-8"?>
+<file path=ppt/notesSlides/notesSlide23.xml><?xml version="1.0" encoding="utf-8"?>
 <p:notes xmlns:a="http://schemas.openxmlformats.org/drawingml/2006/main" xmlns:r="http://schemas.openxmlformats.org/officeDocument/2006/relationships" xmlns:mc="http://schemas.openxmlformats.org/markup-compatibility/2006" xmlns:mv="urn:schemas-microsoft-com:mac:vml" xmlns:p="http://schemas.openxmlformats.org/presentationml/2006/main" xmlns:c="http://schemas.openxmlformats.org/drawingml/2006/chart" xmlns:dgm="http://schemas.openxmlformats.org/drawingml/2006/diagram" xmlns:o="urn:schemas-microsoft-com:office:office" xmlns:v="urn:schemas-microsoft-com:vml" xmlns:pvml="urn:schemas-microsoft-com:office:powerpoint" xmlns:com="http://schemas.openxmlformats.org/drawingml/2006/compatibility" xmlns:p14="http://schemas.microsoft.com/office/powerpoint/2010/main" xmlns:p15="http://schemas.microsoft.com/office/powerpoint/2012/main" xmlns:ahyp="http://schemas.microsoft.com/office/drawing/2018/hyperlinkcolor" showMasterPhAnim="0" showMasterSp="0">
   <p:cSld>
     <p:spTree>
       <p:nvGrpSpPr>
-        <p:cNvPr id="376" name="Shape 376"/>
+        <p:cNvPr id="365" name="Shape 365"/>
         <p:cNvGrpSpPr/>
         <p:nvPr/>
       </p:nvGrpSpPr>
@@ -4115,7 +3971,7 @@
       </p:grpSpPr>
       <p:sp>
         <p:nvSpPr>
-          <p:cNvPr id="377" name="Google Shape;377;gad8afea2a7_3_39:notes"/>
+          <p:cNvPr id="366" name="Google Shape;366;gad8afea2a7_3_26:notes"/>
           <p:cNvSpPr/>
           <p:nvPr>
             <p:ph idx="2" type="sldImg"/>
@@ -4160,7 +4016,7 @@
       </p:sp>
       <p:sp>
         <p:nvSpPr>
-          <p:cNvPr id="378" name="Google Shape;378;gad8afea2a7_3_39:notes"/>
+          <p:cNvPr id="367" name="Google Shape;367;gad8afea2a7_3_26:notes"/>
           <p:cNvSpPr txBox="1"/>
           <p:nvPr>
             <p:ph idx="1" type="body"/>
@@ -4207,7 +4063,176 @@
       </p:sp>
       <p:sp>
         <p:nvSpPr>
-          <p:cNvPr id="379" name="Google Shape;379;gad8afea2a7_3_39:notes"/>
+          <p:cNvPr id="368" name="Google Shape;368;gad8afea2a7_3_26:notes"/>
+          <p:cNvSpPr txBox="1"/>
+          <p:nvPr>
+            <p:ph idx="12" type="sldNum"/>
+          </p:nvPr>
+        </p:nvSpPr>
+        <p:spPr>
+          <a:xfrm>
+            <a:off x="3884613" y="8685213"/>
+            <a:ext cx="2971800" cy="458700"/>
+          </a:xfrm>
+          <a:prstGeom prst="rect">
+            <a:avLst/>
+          </a:prstGeom>
+          <a:noFill/>
+          <a:ln>
+            <a:noFill/>
+          </a:ln>
+        </p:spPr>
+        <p:txBody>
+          <a:bodyPr anchorCtr="0" anchor="b" bIns="45700" lIns="91425" spcFirstLastPara="1" rIns="91425" wrap="square" tIns="45700">
+            <a:noAutofit/>
+          </a:bodyPr>
+          <a:lstStyle/>
+          <a:p>
+            <a:pPr indent="0" lvl="0" marL="0" rtl="0" algn="r">
+              <a:lnSpc>
+                <a:spcPct val="100000"/>
+              </a:lnSpc>
+              <a:spcBef>
+                <a:spcPts val="0"/>
+              </a:spcBef>
+              <a:spcAft>
+                <a:spcPts val="0"/>
+              </a:spcAft>
+              <a:buClr>
+                <a:srgbClr val="000000"/>
+              </a:buClr>
+              <a:buSzPts val="1200"/>
+              <a:buFont typeface="Arial"/>
+              <a:buNone/>
+            </a:pPr>
+            <a:fld id="{00000000-1234-1234-1234-123412341234}" type="slidenum">
+              <a:rPr lang="en-US"/>
+              <a:t>‹#›</a:t>
+            </a:fld>
+            <a:endParaRPr/>
+          </a:p>
+        </p:txBody>
+      </p:sp>
+    </p:spTree>
+  </p:cSld>
+  <p:clrMapOvr>
+    <a:masterClrMapping/>
+  </p:clrMapOvr>
+</p:notes>
+</file>
+
+<file path=ppt/notesSlides/notesSlide24.xml><?xml version="1.0" encoding="utf-8"?>
+<p:notes xmlns:a="http://schemas.openxmlformats.org/drawingml/2006/main" xmlns:r="http://schemas.openxmlformats.org/officeDocument/2006/relationships" xmlns:mc="http://schemas.openxmlformats.org/markup-compatibility/2006" xmlns:mv="urn:schemas-microsoft-com:mac:vml" xmlns:p="http://schemas.openxmlformats.org/presentationml/2006/main" xmlns:c="http://schemas.openxmlformats.org/drawingml/2006/chart" xmlns:dgm="http://schemas.openxmlformats.org/drawingml/2006/diagram" xmlns:o="urn:schemas-microsoft-com:office:office" xmlns:v="urn:schemas-microsoft-com:vml" xmlns:pvml="urn:schemas-microsoft-com:office:powerpoint" xmlns:com="http://schemas.openxmlformats.org/drawingml/2006/compatibility" xmlns:p14="http://schemas.microsoft.com/office/powerpoint/2010/main" xmlns:p15="http://schemas.microsoft.com/office/powerpoint/2012/main" xmlns:ahyp="http://schemas.microsoft.com/office/drawing/2018/hyperlinkcolor" showMasterPhAnim="0" showMasterSp="0">
+  <p:cSld>
+    <p:spTree>
+      <p:nvGrpSpPr>
+        <p:cNvPr id="372" name="Shape 372"/>
+        <p:cNvGrpSpPr/>
+        <p:nvPr/>
+      </p:nvGrpSpPr>
+      <p:grpSpPr>
+        <a:xfrm>
+          <a:off x="0" y="0"/>
+          <a:ext cx="0" cy="0"/>
+          <a:chOff x="0" y="0"/>
+          <a:chExt cx="0" cy="0"/>
+        </a:xfrm>
+      </p:grpSpPr>
+      <p:sp>
+        <p:nvSpPr>
+          <p:cNvPr id="373" name="Google Shape;373;gad8afea2a7_3_39:notes"/>
+          <p:cNvSpPr/>
+          <p:nvPr>
+            <p:ph idx="2" type="sldImg"/>
+          </p:nvPr>
+        </p:nvSpPr>
+        <p:spPr>
+          <a:xfrm>
+            <a:off x="1200150" y="1143000"/>
+            <a:ext cx="4457700" cy="3086100"/>
+          </a:xfrm>
+          <a:custGeom>
+            <a:rect b="b" l="l" r="r" t="t"/>
+            <a:pathLst>
+              <a:path extrusionOk="0" h="120000" w="120000">
+                <a:moveTo>
+                  <a:pt x="0" y="0"/>
+                </a:moveTo>
+                <a:lnTo>
+                  <a:pt x="120000" y="0"/>
+                </a:lnTo>
+                <a:lnTo>
+                  <a:pt x="120000" y="120000"/>
+                </a:lnTo>
+                <a:lnTo>
+                  <a:pt x="0" y="120000"/>
+                </a:lnTo>
+                <a:close/>
+              </a:path>
+            </a:pathLst>
+          </a:custGeom>
+          <a:noFill/>
+          <a:ln cap="flat" cmpd="sng" w="12700">
+            <a:solidFill>
+              <a:srgbClr val="000000"/>
+            </a:solidFill>
+            <a:prstDash val="solid"/>
+            <a:round/>
+            <a:headEnd len="sm" w="sm" type="none"/>
+            <a:tailEnd len="sm" w="sm" type="none"/>
+          </a:ln>
+        </p:spPr>
+      </p:sp>
+      <p:sp>
+        <p:nvSpPr>
+          <p:cNvPr id="374" name="Google Shape;374;gad8afea2a7_3_39:notes"/>
+          <p:cNvSpPr txBox="1"/>
+          <p:nvPr>
+            <p:ph idx="1" type="body"/>
+          </p:nvPr>
+        </p:nvSpPr>
+        <p:spPr>
+          <a:xfrm>
+            <a:off x="685800" y="4400550"/>
+            <a:ext cx="5486400" cy="3600600"/>
+          </a:xfrm>
+          <a:prstGeom prst="rect">
+            <a:avLst/>
+          </a:prstGeom>
+          <a:noFill/>
+          <a:ln>
+            <a:noFill/>
+          </a:ln>
+        </p:spPr>
+        <p:txBody>
+          <a:bodyPr anchorCtr="0" anchor="t" bIns="91425" lIns="91425" spcFirstLastPara="1" rIns="91425" wrap="square" tIns="91425">
+            <a:noAutofit/>
+          </a:bodyPr>
+          <a:lstStyle/>
+          <a:p>
+            <a:pPr indent="0" lvl="0" marL="0" rtl="0" algn="l">
+              <a:lnSpc>
+                <a:spcPct val="100000"/>
+              </a:lnSpc>
+              <a:spcBef>
+                <a:spcPts val="0"/>
+              </a:spcBef>
+              <a:spcAft>
+                <a:spcPts val="0"/>
+              </a:spcAft>
+              <a:buSzPts val="1400"/>
+              <a:buNone/>
+            </a:pPr>
+            <a:r>
+              <a:t/>
+            </a:r>
+            <a:endParaRPr/>
+          </a:p>
+        </p:txBody>
+      </p:sp>
+      <p:sp>
+        <p:nvSpPr>
+          <p:cNvPr id="375" name="Google Shape;375;gad8afea2a7_3_39:notes"/>
           <p:cNvSpPr txBox="1"/>
           <p:nvPr>
             <p:ph idx="12" type="sldNum"/>
@@ -4484,6 +4509,16 @@
               </a:path>
             </a:pathLst>
           </a:custGeom>
+          <a:noFill/>
+          <a:ln cap="flat" cmpd="sng" w="12700">
+            <a:solidFill>
+              <a:srgbClr val="000000"/>
+            </a:solidFill>
+            <a:prstDash val="solid"/>
+            <a:round/>
+            <a:headEnd len="sm" w="sm" type="none"/>
+            <a:tailEnd len="sm" w="sm" type="none"/>
+          </a:ln>
         </p:spPr>
       </p:sp>
       <p:sp>
@@ -4502,6 +4537,10 @@
           <a:prstGeom prst="rect">
             <a:avLst/>
           </a:prstGeom>
+          <a:noFill/>
+          <a:ln>
+            <a:noFill/>
+          </a:ln>
         </p:spPr>
         <p:txBody>
           <a:bodyPr anchorCtr="0" anchor="t" bIns="91425" lIns="91425" spcFirstLastPara="1" rIns="91425" wrap="square" tIns="91425">
@@ -4510,12 +4549,16 @@
           <a:lstStyle/>
           <a:p>
             <a:pPr indent="0" lvl="0" marL="0" rtl="0" algn="l">
-              <a:spcBef>
-                <a:spcPts val="0"/>
-              </a:spcBef>
-              <a:spcAft>
-                <a:spcPts val="0"/>
-              </a:spcAft>
+              <a:lnSpc>
+                <a:spcPct val="100000"/>
+              </a:lnSpc>
+              <a:spcBef>
+                <a:spcPts val="0"/>
+              </a:spcBef>
+              <a:spcAft>
+                <a:spcPts val="0"/>
+              </a:spcAft>
+              <a:buSzPts val="1400"/>
               <a:buNone/>
             </a:pPr>
             <a:r>
@@ -4541,6 +4584,10 @@
           <a:prstGeom prst="rect">
             <a:avLst/>
           </a:prstGeom>
+          <a:noFill/>
+          <a:ln>
+            <a:noFill/>
+          </a:ln>
         </p:spPr>
         <p:txBody>
           <a:bodyPr anchorCtr="0" anchor="b" bIns="45700" lIns="91425" spcFirstLastPara="1" rIns="91425" wrap="square" tIns="45700">
@@ -4549,6 +4596,9 @@
           <a:lstStyle/>
           <a:p>
             <a:pPr indent="0" lvl="0" marL="0" rtl="0" algn="r">
+              <a:lnSpc>
+                <a:spcPct val="100000"/>
+              </a:lnSpc>
               <a:spcBef>
                 <a:spcPts val="0"/>
               </a:spcBef>
@@ -5261,7 +5311,7 @@
       </p:grpSpPr>
       <p:sp>
         <p:nvSpPr>
-          <p:cNvPr id="182" name="Google Shape;182;gad8afea2a7_0_18:notes"/>
+          <p:cNvPr id="182" name="Google Shape;182;gaf56e44d72_0_9:notes"/>
           <p:cNvSpPr/>
           <p:nvPr>
             <p:ph idx="2" type="sldImg"/>
@@ -5306,7 +5356,7 @@
       </p:sp>
       <p:sp>
         <p:nvSpPr>
-          <p:cNvPr id="183" name="Google Shape;183;gad8afea2a7_0_18:notes"/>
+          <p:cNvPr id="183" name="Google Shape;183;gaf56e44d72_0_9:notes"/>
           <p:cNvSpPr txBox="1"/>
           <p:nvPr>
             <p:ph idx="1" type="body"/>
@@ -5353,7 +5403,7 @@
       </p:sp>
       <p:sp>
         <p:nvSpPr>
-          <p:cNvPr id="184" name="Google Shape;184;gad8afea2a7_0_18:notes"/>
+          <p:cNvPr id="184" name="Google Shape;184;gaf56e44d72_0_9:notes"/>
           <p:cNvSpPr txBox="1"/>
           <p:nvPr>
             <p:ph idx="12" type="sldNum"/>
@@ -6814,7 +6864,7 @@
               <a:alphaModFix/>
             </a:blip>
             <a:stretch>
-              <a:fillRect b="-62782" l="-400" r="-399" t="-60198"/>
+              <a:fillRect b="-62775" l="-399" r="-397" t="-60195"/>
             </a:stretch>
           </a:blipFill>
           <a:ln>
@@ -22953,7 +23003,7 @@
   <p:cSld>
     <p:spTree>
       <p:nvGrpSpPr>
-        <p:cNvPr id="194" name="Shape 194"/>
+        <p:cNvPr id="192" name="Shape 192"/>
         <p:cNvGrpSpPr/>
         <p:nvPr/>
       </p:nvGrpSpPr>
@@ -22967,7 +23017,7 @@
       </p:grpSpPr>
       <p:sp>
         <p:nvSpPr>
-          <p:cNvPr id="195" name="Google Shape;195;gad8afea2a7_0_27"/>
+          <p:cNvPr id="193" name="Google Shape;193;gad8afea2a7_0_18"/>
           <p:cNvSpPr txBox="1"/>
           <p:nvPr>
             <p:ph idx="7" type="body"/>
@@ -23083,7 +23133,7 @@
       </p:sp>
       <p:pic>
         <p:nvPicPr>
-          <p:cNvPr id="196" name="Google Shape;196;gad8afea2a7_0_27"/>
+          <p:cNvPr id="194" name="Google Shape;194;gad8afea2a7_0_18"/>
           <p:cNvPicPr preferRelativeResize="0"/>
           <p:nvPr/>
         </p:nvPicPr>
@@ -23091,13 +23141,13 @@
           <a:blip r:embed="rId3">
             <a:alphaModFix/>
           </a:blip>
-          <a:srcRect b="0" l="0" r="29867" t="0"/>
+          <a:srcRect b="0" l="0" r="41877" t="29463"/>
           <a:stretch/>
         </p:blipFill>
         <p:spPr>
           <a:xfrm>
-            <a:off x="513500" y="1939875"/>
-            <a:ext cx="8727151" cy="3936749"/>
+            <a:off x="570350" y="1721624"/>
+            <a:ext cx="8765301" cy="3998576"/>
           </a:xfrm>
           <a:prstGeom prst="rect">
             <a:avLst/>
@@ -23121,7 +23171,7 @@
   <p:cSld>
     <p:spTree>
       <p:nvGrpSpPr>
-        <p:cNvPr id="201" name="Shape 201"/>
+        <p:cNvPr id="199" name="Shape 199"/>
         <p:cNvGrpSpPr/>
         <p:nvPr/>
       </p:nvGrpSpPr>
@@ -23135,7 +23185,7 @@
       </p:grpSpPr>
       <p:sp>
         <p:nvSpPr>
-          <p:cNvPr id="202" name="Google Shape;202;gad8afea2a7_5_1"/>
+          <p:cNvPr id="200" name="Google Shape;200;gaf56e44d72_0_15"/>
           <p:cNvSpPr txBox="1"/>
           <p:nvPr>
             <p:ph idx="7" type="body"/>
@@ -23249,75 +23299,33 @@
           </a:p>
         </p:txBody>
       </p:sp>
-      <p:grpSp>
-        <p:nvGrpSpPr>
-          <p:cNvPr id="203" name="Google Shape;203;gad8afea2a7_5_1"/>
-          <p:cNvGrpSpPr/>
+      <p:pic>
+        <p:nvPicPr>
+          <p:cNvPr id="201" name="Google Shape;201;gaf56e44d72_0_15"/>
+          <p:cNvPicPr preferRelativeResize="0"/>
           <p:nvPr/>
-        </p:nvGrpSpPr>
-        <p:grpSpPr>
+        </p:nvPicPr>
+        <p:blipFill rotWithShape="1">
+          <a:blip r:embed="rId3">
+            <a:alphaModFix/>
+          </a:blip>
+          <a:srcRect b="0" l="57610" r="-580" t="26766"/>
+          <a:stretch/>
+        </p:blipFill>
+        <p:spPr>
           <a:xfrm>
-            <a:off x="1041781" y="2031097"/>
-            <a:ext cx="7822442" cy="3674242"/>
-            <a:chOff x="1545675" y="2043075"/>
-            <a:chExt cx="6392450" cy="3217375"/>
+            <a:off x="1776238" y="1689450"/>
+            <a:ext cx="6621874" cy="4242249"/>
           </a:xfrm>
-        </p:grpSpPr>
-        <p:pic>
-          <p:nvPicPr>
-            <p:cNvPr id="204" name="Google Shape;204;gad8afea2a7_5_1"/>
-            <p:cNvPicPr preferRelativeResize="0"/>
-            <p:nvPr/>
-          </p:nvPicPr>
-          <p:blipFill rotWithShape="1">
-            <a:blip r:embed="rId3">
-              <a:alphaModFix/>
-            </a:blip>
-            <a:srcRect b="0" l="71326" r="1709" t="3091"/>
-            <a:stretch/>
-          </p:blipFill>
-          <p:spPr>
-            <a:xfrm>
-              <a:off x="1545675" y="2043075"/>
-              <a:ext cx="2829925" cy="3217375"/>
-            </a:xfrm>
-            <a:prstGeom prst="rect">
-              <a:avLst/>
-            </a:prstGeom>
+          <a:prstGeom prst="rect">
+            <a:avLst/>
+          </a:prstGeom>
+          <a:noFill/>
+          <a:ln>
             <a:noFill/>
-            <a:ln>
-              <a:noFill/>
-            </a:ln>
-          </p:spPr>
-        </p:pic>
-        <p:pic>
-          <p:nvPicPr>
-            <p:cNvPr id="205" name="Google Shape;205;gad8afea2a7_5_1"/>
-            <p:cNvPicPr preferRelativeResize="0"/>
-            <p:nvPr/>
-          </p:nvPicPr>
-          <p:blipFill rotWithShape="1">
-            <a:blip r:embed="rId4">
-              <a:alphaModFix/>
-            </a:blip>
-            <a:srcRect b="3090" l="41611" r="0" t="0"/>
-            <a:stretch/>
-          </p:blipFill>
-          <p:spPr>
-            <a:xfrm>
-              <a:off x="4272925" y="2043075"/>
-              <a:ext cx="3665200" cy="3217375"/>
-            </a:xfrm>
-            <a:prstGeom prst="rect">
-              <a:avLst/>
-            </a:prstGeom>
-            <a:noFill/>
-            <a:ln>
-              <a:noFill/>
-            </a:ln>
-          </p:spPr>
-        </p:pic>
-      </p:grpSp>
+          </a:ln>
+        </p:spPr>
+      </p:pic>
     </p:spTree>
   </p:cSld>
   <p:clrMapOvr>
@@ -23331,7 +23339,7 @@
   <p:cSld>
     <p:spTree>
       <p:nvGrpSpPr>
-        <p:cNvPr id="209" name="Shape 209"/>
+        <p:cNvPr id="205" name="Shape 205"/>
         <p:cNvGrpSpPr/>
         <p:nvPr/>
       </p:nvGrpSpPr>
@@ -23345,17 +23353,16 @@
       </p:grpSpPr>
       <p:pic>
         <p:nvPicPr>
-          <p:cNvPr id="210" name="Google Shape;210;p14"/>
+          <p:cNvPr id="206" name="Google Shape;206;p14"/>
           <p:cNvPicPr preferRelativeResize="0"/>
           <p:nvPr/>
         </p:nvPicPr>
-        <p:blipFill>
+        <p:blipFill rotWithShape="1">
           <a:blip r:embed="rId3">
             <a:alphaModFix/>
           </a:blip>
-          <a:stretch>
-            <a:fillRect/>
-          </a:stretch>
+          <a:srcRect b="0" l="0" r="0" t="0"/>
+          <a:stretch/>
         </p:blipFill>
         <p:spPr>
           <a:xfrm>
@@ -23373,7 +23380,7 @@
       </p:pic>
       <p:sp>
         <p:nvSpPr>
-          <p:cNvPr id="211" name="Google Shape;211;p14"/>
+          <p:cNvPr id="207" name="Google Shape;207;p14"/>
           <p:cNvSpPr txBox="1"/>
           <p:nvPr>
             <p:ph idx="7" type="body"/>
@@ -23489,7 +23496,7 @@
       </p:sp>
       <p:sp>
         <p:nvSpPr>
-          <p:cNvPr id="212" name="Google Shape;212;p14"/>
+          <p:cNvPr id="208" name="Google Shape;208;p14"/>
           <p:cNvSpPr txBox="1"/>
           <p:nvPr/>
         </p:nvSpPr>
@@ -23652,7 +23659,15 @@
             <a:r>
               <a:t/>
             </a:r>
-            <a:endParaRPr sz="1800"/>
+            <a:endParaRPr b="0" i="0" sz="1800" u="none" cap="none" strike="noStrike">
+              <a:solidFill>
+                <a:srgbClr val="000000"/>
+              </a:solidFill>
+              <a:latin typeface="Arial"/>
+              <a:ea typeface="Arial"/>
+              <a:cs typeface="Arial"/>
+              <a:sym typeface="Arial"/>
+            </a:endParaRPr>
           </a:p>
           <a:p>
             <a:pPr indent="0" lvl="0" marL="0" marR="0" rtl="0" algn="l">
@@ -23673,10 +23688,26 @@
               <a:buNone/>
             </a:pPr>
             <a:r>
-              <a:rPr lang="en-US" sz="1800"/>
+              <a:rPr b="0" i="0" lang="en-US" sz="1800" u="none" cap="none" strike="noStrike">
+                <a:solidFill>
+                  <a:srgbClr val="000000"/>
+                </a:solidFill>
+                <a:latin typeface="Arial"/>
+                <a:ea typeface="Arial"/>
+                <a:cs typeface="Arial"/>
+                <a:sym typeface="Arial"/>
+              </a:rPr>
               <a:t>Blue box : sensor, actuator, prediction</a:t>
             </a:r>
-            <a:endParaRPr sz="1800"/>
+            <a:endParaRPr b="0" i="0" sz="1800" u="none" cap="none" strike="noStrike">
+              <a:solidFill>
+                <a:srgbClr val="000000"/>
+              </a:solidFill>
+              <a:latin typeface="Arial"/>
+              <a:ea typeface="Arial"/>
+              <a:cs typeface="Arial"/>
+              <a:sym typeface="Arial"/>
+            </a:endParaRPr>
           </a:p>
           <a:p>
             <a:pPr indent="0" lvl="0" marL="0" marR="0" rtl="0" algn="l">
@@ -23697,10 +23728,26 @@
               <a:buNone/>
             </a:pPr>
             <a:r>
-              <a:rPr lang="en-US" sz="1800"/>
+              <a:rPr b="0" i="0" lang="en-US" sz="1800" u="none" cap="none" strike="noStrike">
+                <a:solidFill>
+                  <a:srgbClr val="000000"/>
+                </a:solidFill>
+                <a:latin typeface="Arial"/>
+                <a:ea typeface="Arial"/>
+                <a:cs typeface="Arial"/>
+                <a:sym typeface="Arial"/>
+              </a:rPr>
               <a:t>Yellow box: commands</a:t>
             </a:r>
-            <a:endParaRPr sz="1800"/>
+            <a:endParaRPr b="0" i="0" sz="1800" u="none" cap="none" strike="noStrike">
+              <a:solidFill>
+                <a:srgbClr val="000000"/>
+              </a:solidFill>
+              <a:latin typeface="Arial"/>
+              <a:ea typeface="Arial"/>
+              <a:cs typeface="Arial"/>
+              <a:sym typeface="Arial"/>
+            </a:endParaRPr>
           </a:p>
           <a:p>
             <a:pPr indent="0" lvl="0" marL="0" marR="0" rtl="0" algn="l">
@@ -23723,7 +23770,15 @@
             <a:r>
               <a:t/>
             </a:r>
-            <a:endParaRPr sz="1800"/>
+            <a:endParaRPr b="0" i="0" sz="1800" u="none" cap="none" strike="noStrike">
+              <a:solidFill>
+                <a:srgbClr val="000000"/>
+              </a:solidFill>
+              <a:latin typeface="Arial"/>
+              <a:ea typeface="Arial"/>
+              <a:cs typeface="Arial"/>
+              <a:sym typeface="Arial"/>
+            </a:endParaRPr>
           </a:p>
           <a:p>
             <a:pPr indent="0" lvl="0" marL="0" marR="0" rtl="0" algn="l">
@@ -23746,13 +23801,21 @@
             <a:r>
               <a:t/>
             </a:r>
-            <a:endParaRPr sz="1800"/>
+            <a:endParaRPr b="0" i="0" sz="1800" u="none" cap="none" strike="noStrike">
+              <a:solidFill>
+                <a:srgbClr val="000000"/>
+              </a:solidFill>
+              <a:latin typeface="Arial"/>
+              <a:ea typeface="Arial"/>
+              <a:cs typeface="Arial"/>
+              <a:sym typeface="Arial"/>
+            </a:endParaRPr>
           </a:p>
         </p:txBody>
       </p:sp>
       <p:sp>
         <p:nvSpPr>
-          <p:cNvPr id="213" name="Google Shape;213;p14"/>
+          <p:cNvPr id="209" name="Google Shape;209;p14"/>
           <p:cNvSpPr txBox="1"/>
           <p:nvPr/>
         </p:nvSpPr>
@@ -23826,7 +23889,7 @@
       </p:sp>
       <p:sp>
         <p:nvSpPr>
-          <p:cNvPr id="214" name="Google Shape;214;p14"/>
+          <p:cNvPr id="210" name="Google Shape;210;p14"/>
           <p:cNvSpPr txBox="1"/>
           <p:nvPr/>
         </p:nvSpPr>
@@ -23900,7 +23963,7 @@
       </p:sp>
       <p:sp>
         <p:nvSpPr>
-          <p:cNvPr id="215" name="Google Shape;215;p14"/>
+          <p:cNvPr id="211" name="Google Shape;211;p14"/>
           <p:cNvSpPr txBox="1"/>
           <p:nvPr/>
         </p:nvSpPr>
@@ -23974,7 +24037,7 @@
       </p:sp>
       <p:sp>
         <p:nvSpPr>
-          <p:cNvPr id="216" name="Google Shape;216;p14"/>
+          <p:cNvPr id="212" name="Google Shape;212;p14"/>
           <p:cNvSpPr txBox="1"/>
           <p:nvPr/>
         </p:nvSpPr>
@@ -24048,7 +24111,7 @@
       </p:sp>
       <p:sp>
         <p:nvSpPr>
-          <p:cNvPr id="217" name="Google Shape;217;p14"/>
+          <p:cNvPr id="213" name="Google Shape;213;p14"/>
           <p:cNvSpPr txBox="1"/>
           <p:nvPr/>
         </p:nvSpPr>
@@ -24122,7 +24185,7 @@
       </p:sp>
       <p:sp>
         <p:nvSpPr>
-          <p:cNvPr id="218" name="Google Shape;218;p14"/>
+          <p:cNvPr id="214" name="Google Shape;214;p14"/>
           <p:cNvSpPr txBox="1"/>
           <p:nvPr/>
         </p:nvSpPr>
@@ -24207,7 +24270,7 @@
   <p:cSld>
     <p:spTree>
       <p:nvGrpSpPr>
-        <p:cNvPr id="223" name="Shape 223"/>
+        <p:cNvPr id="219" name="Shape 219"/>
         <p:cNvGrpSpPr/>
         <p:nvPr/>
       </p:nvGrpSpPr>
@@ -24221,7 +24284,7 @@
       </p:grpSpPr>
       <p:sp>
         <p:nvSpPr>
-          <p:cNvPr id="224" name="Google Shape;224;gad8afea2a7_1_0"/>
+          <p:cNvPr id="220" name="Google Shape;220;gad8afea2a7_1_0"/>
           <p:cNvSpPr txBox="1"/>
           <p:nvPr>
             <p:ph idx="7" type="body"/>
@@ -24337,7 +24400,7 @@
       </p:sp>
       <p:sp>
         <p:nvSpPr>
-          <p:cNvPr id="225" name="Google Shape;225;gad8afea2a7_1_0"/>
+          <p:cNvPr id="221" name="Google Shape;221;gad8afea2a7_1_0"/>
           <p:cNvSpPr/>
           <p:nvPr/>
         </p:nvSpPr>
@@ -24451,7 +24514,7 @@
       </p:sp>
       <p:sp>
         <p:nvSpPr>
-          <p:cNvPr id="226" name="Google Shape;226;gad8afea2a7_1_0"/>
+          <p:cNvPr id="222" name="Google Shape;222;gad8afea2a7_1_0"/>
           <p:cNvSpPr/>
           <p:nvPr/>
         </p:nvSpPr>
@@ -24565,10 +24628,10 @@
       </p:sp>
       <p:cxnSp>
         <p:nvCxnSpPr>
-          <p:cNvPr id="227" name="Google Shape;227;gad8afea2a7_1_0"/>
+          <p:cNvPr id="223" name="Google Shape;223;gad8afea2a7_1_0"/>
           <p:cNvCxnSpPr>
-            <a:stCxn id="225" idx="2"/>
-            <a:endCxn id="226" idx="0"/>
+            <a:stCxn id="221" idx="2"/>
+            <a:endCxn id="222" idx="0"/>
           </p:cNvCxnSpPr>
           <p:nvPr/>
         </p:nvCxnSpPr>
@@ -24594,7 +24657,7 @@
       </p:cxnSp>
       <p:sp>
         <p:nvSpPr>
-          <p:cNvPr id="228" name="Google Shape;228;gad8afea2a7_1_0"/>
+          <p:cNvPr id="224" name="Google Shape;224;gad8afea2a7_1_0"/>
           <p:cNvSpPr/>
           <p:nvPr/>
         </p:nvSpPr>
@@ -24708,7 +24771,7 @@
       </p:sp>
       <p:sp>
         <p:nvSpPr>
-          <p:cNvPr id="229" name="Google Shape;229;gad8afea2a7_1_0"/>
+          <p:cNvPr id="225" name="Google Shape;225;gad8afea2a7_1_0"/>
           <p:cNvSpPr/>
           <p:nvPr/>
         </p:nvSpPr>
@@ -24822,10 +24885,10 @@
       </p:sp>
       <p:cxnSp>
         <p:nvCxnSpPr>
-          <p:cNvPr id="230" name="Google Shape;230;gad8afea2a7_1_0"/>
+          <p:cNvPr id="226" name="Google Shape;226;gad8afea2a7_1_0"/>
           <p:cNvCxnSpPr>
-            <a:stCxn id="226" idx="2"/>
-            <a:endCxn id="229" idx="1"/>
+            <a:stCxn id="222" idx="2"/>
+            <a:endCxn id="225" idx="1"/>
           </p:cNvCxnSpPr>
           <p:nvPr/>
         </p:nvCxnSpPr>
@@ -24851,10 +24914,10 @@
       </p:cxnSp>
       <p:cxnSp>
         <p:nvCxnSpPr>
-          <p:cNvPr id="231" name="Google Shape;231;gad8afea2a7_1_0"/>
+          <p:cNvPr id="227" name="Google Shape;227;gad8afea2a7_1_0"/>
           <p:cNvCxnSpPr>
-            <a:stCxn id="228" idx="2"/>
-            <a:endCxn id="229" idx="0"/>
+            <a:stCxn id="224" idx="2"/>
+            <a:endCxn id="225" idx="0"/>
           </p:cNvCxnSpPr>
           <p:nvPr/>
         </p:nvCxnSpPr>
@@ -24891,7 +24954,7 @@
   <p:cSld>
     <p:spTree>
       <p:nvGrpSpPr>
-        <p:cNvPr id="235" name="Shape 235"/>
+        <p:cNvPr id="231" name="Shape 231"/>
         <p:cNvGrpSpPr/>
         <p:nvPr/>
       </p:nvGrpSpPr>
@@ -24905,7 +24968,7 @@
       </p:grpSpPr>
       <p:sp>
         <p:nvSpPr>
-          <p:cNvPr id="236" name="Google Shape;236;gadbe60d9e0_0_9"/>
+          <p:cNvPr id="232" name="Google Shape;232;gadbe60d9e0_0_9"/>
           <p:cNvSpPr txBox="1"/>
           <p:nvPr>
             <p:ph idx="7" type="body"/>
@@ -25021,7 +25084,7 @@
       </p:sp>
       <p:cxnSp>
         <p:nvCxnSpPr>
-          <p:cNvPr id="237" name="Google Shape;237;gadbe60d9e0_0_9"/>
+          <p:cNvPr id="233" name="Google Shape;233;gadbe60d9e0_0_9"/>
           <p:cNvCxnSpPr/>
           <p:nvPr/>
         </p:nvCxnSpPr>
@@ -25047,7 +25110,7 @@
       </p:cxnSp>
       <p:sp>
         <p:nvSpPr>
-          <p:cNvPr id="238" name="Google Shape;238;gadbe60d9e0_0_9"/>
+          <p:cNvPr id="234" name="Google Shape;234;gadbe60d9e0_0_9"/>
           <p:cNvSpPr txBox="1"/>
           <p:nvPr/>
         </p:nvSpPr>
@@ -25131,7 +25194,7 @@
       </p:sp>
       <p:cxnSp>
         <p:nvCxnSpPr>
-          <p:cNvPr id="239" name="Google Shape;239;gadbe60d9e0_0_9"/>
+          <p:cNvPr id="235" name="Google Shape;235;gadbe60d9e0_0_9"/>
           <p:cNvCxnSpPr/>
           <p:nvPr/>
         </p:nvCxnSpPr>
@@ -25157,7 +25220,7 @@
       </p:cxnSp>
       <p:cxnSp>
         <p:nvCxnSpPr>
-          <p:cNvPr id="240" name="Google Shape;240;gadbe60d9e0_0_9"/>
+          <p:cNvPr id="236" name="Google Shape;236;gadbe60d9e0_0_9"/>
           <p:cNvCxnSpPr/>
           <p:nvPr/>
         </p:nvCxnSpPr>
@@ -25183,7 +25246,7 @@
       </p:cxnSp>
       <p:cxnSp>
         <p:nvCxnSpPr>
-          <p:cNvPr id="241" name="Google Shape;241;gadbe60d9e0_0_9"/>
+          <p:cNvPr id="237" name="Google Shape;237;gadbe60d9e0_0_9"/>
           <p:cNvCxnSpPr/>
           <p:nvPr/>
         </p:nvCxnSpPr>
@@ -25209,7 +25272,7 @@
       </p:cxnSp>
       <p:sp>
         <p:nvSpPr>
-          <p:cNvPr id="242" name="Google Shape;242;gadbe60d9e0_0_9"/>
+          <p:cNvPr id="238" name="Google Shape;238;gadbe60d9e0_0_9"/>
           <p:cNvSpPr txBox="1"/>
           <p:nvPr/>
         </p:nvSpPr>
@@ -25315,7 +25378,7 @@
       </p:sp>
       <p:sp>
         <p:nvSpPr>
-          <p:cNvPr id="243" name="Google Shape;243;gadbe60d9e0_0_9"/>
+          <p:cNvPr id="239" name="Google Shape;239;gadbe60d9e0_0_9"/>
           <p:cNvSpPr txBox="1"/>
           <p:nvPr/>
         </p:nvSpPr>
@@ -25421,7 +25484,7 @@
       </p:sp>
       <p:cxnSp>
         <p:nvCxnSpPr>
-          <p:cNvPr id="244" name="Google Shape;244;gadbe60d9e0_0_9"/>
+          <p:cNvPr id="240" name="Google Shape;240;gadbe60d9e0_0_9"/>
           <p:cNvCxnSpPr/>
           <p:nvPr/>
         </p:nvCxnSpPr>
@@ -25447,7 +25510,7 @@
       </p:cxnSp>
       <p:cxnSp>
         <p:nvCxnSpPr>
-          <p:cNvPr id="245" name="Google Shape;245;gadbe60d9e0_0_9"/>
+          <p:cNvPr id="241" name="Google Shape;241;gadbe60d9e0_0_9"/>
           <p:cNvCxnSpPr/>
           <p:nvPr/>
         </p:nvCxnSpPr>
@@ -25473,7 +25536,7 @@
       </p:cxnSp>
       <p:cxnSp>
         <p:nvCxnSpPr>
-          <p:cNvPr id="246" name="Google Shape;246;gadbe60d9e0_0_9"/>
+          <p:cNvPr id="242" name="Google Shape;242;gadbe60d9e0_0_9"/>
           <p:cNvCxnSpPr/>
           <p:nvPr/>
         </p:nvCxnSpPr>
@@ -25499,7 +25562,7 @@
       </p:cxnSp>
       <p:cxnSp>
         <p:nvCxnSpPr>
-          <p:cNvPr id="247" name="Google Shape;247;gadbe60d9e0_0_9"/>
+          <p:cNvPr id="243" name="Google Shape;243;gadbe60d9e0_0_9"/>
           <p:cNvCxnSpPr/>
           <p:nvPr/>
         </p:nvCxnSpPr>
@@ -25525,7 +25588,7 @@
       </p:cxnSp>
       <p:sp>
         <p:nvSpPr>
-          <p:cNvPr id="248" name="Google Shape;248;gadbe60d9e0_0_9"/>
+          <p:cNvPr id="244" name="Google Shape;244;gadbe60d9e0_0_9"/>
           <p:cNvSpPr txBox="1"/>
           <p:nvPr/>
         </p:nvSpPr>
@@ -25622,7 +25685,7 @@
       </p:sp>
       <p:sp>
         <p:nvSpPr>
-          <p:cNvPr id="249" name="Google Shape;249;gadbe60d9e0_0_9"/>
+          <p:cNvPr id="245" name="Google Shape;245;gadbe60d9e0_0_9"/>
           <p:cNvSpPr txBox="1"/>
           <p:nvPr/>
         </p:nvSpPr>
@@ -25688,7 +25751,7 @@
       </p:sp>
       <p:cxnSp>
         <p:nvCxnSpPr>
-          <p:cNvPr id="250" name="Google Shape;250;gadbe60d9e0_0_9"/>
+          <p:cNvPr id="246" name="Google Shape;246;gadbe60d9e0_0_9"/>
           <p:cNvCxnSpPr/>
           <p:nvPr/>
         </p:nvCxnSpPr>
@@ -25714,7 +25777,7 @@
       </p:cxnSp>
       <p:sp>
         <p:nvSpPr>
-          <p:cNvPr id="251" name="Google Shape;251;gadbe60d9e0_0_9"/>
+          <p:cNvPr id="247" name="Google Shape;247;gadbe60d9e0_0_9"/>
           <p:cNvSpPr txBox="1"/>
           <p:nvPr/>
         </p:nvSpPr>
@@ -25786,7 +25849,7 @@
       </p:sp>
       <p:sp>
         <p:nvSpPr>
-          <p:cNvPr id="252" name="Google Shape;252;gadbe60d9e0_0_9"/>
+          <p:cNvPr id="248" name="Google Shape;248;gadbe60d9e0_0_9"/>
           <p:cNvSpPr txBox="1"/>
           <p:nvPr/>
         </p:nvSpPr>
@@ -25858,9 +25921,9 @@
       </p:sp>
       <p:cxnSp>
         <p:nvCxnSpPr>
-          <p:cNvPr id="253" name="Google Shape;253;gadbe60d9e0_0_9"/>
+          <p:cNvPr id="249" name="Google Shape;249;gadbe60d9e0_0_9"/>
           <p:cNvCxnSpPr>
-            <a:stCxn id="251" idx="2"/>
+            <a:stCxn id="247" idx="2"/>
           </p:cNvCxnSpPr>
           <p:nvPr/>
         </p:nvCxnSpPr>
@@ -25886,7 +25949,7 @@
       </p:cxnSp>
       <p:cxnSp>
         <p:nvCxnSpPr>
-          <p:cNvPr id="254" name="Google Shape;254;gadbe60d9e0_0_9"/>
+          <p:cNvPr id="250" name="Google Shape;250;gadbe60d9e0_0_9"/>
           <p:cNvCxnSpPr/>
           <p:nvPr/>
         </p:nvCxnSpPr>
@@ -25923,7 +25986,7 @@
   <p:cSld>
     <p:spTree>
       <p:nvGrpSpPr>
-        <p:cNvPr id="258" name="Shape 258"/>
+        <p:cNvPr id="254" name="Shape 254"/>
         <p:cNvGrpSpPr/>
         <p:nvPr/>
       </p:nvGrpSpPr>
@@ -25937,7 +26000,7 @@
       </p:grpSpPr>
       <p:sp>
         <p:nvSpPr>
-          <p:cNvPr id="259" name="Google Shape;259;gad8afea2a7_5_35"/>
+          <p:cNvPr id="255" name="Google Shape;255;gad8afea2a7_5_35"/>
           <p:cNvSpPr txBox="1"/>
           <p:nvPr>
             <p:ph idx="7" type="body"/>
@@ -26053,7 +26116,7 @@
       </p:sp>
       <p:cxnSp>
         <p:nvCxnSpPr>
-          <p:cNvPr id="260" name="Google Shape;260;gad8afea2a7_5_35"/>
+          <p:cNvPr id="256" name="Google Shape;256;gad8afea2a7_5_35"/>
           <p:cNvCxnSpPr/>
           <p:nvPr/>
         </p:nvCxnSpPr>
@@ -26079,7 +26142,7 @@
       </p:cxnSp>
       <p:cxnSp>
         <p:nvCxnSpPr>
-          <p:cNvPr id="261" name="Google Shape;261;gad8afea2a7_5_35"/>
+          <p:cNvPr id="257" name="Google Shape;257;gad8afea2a7_5_35"/>
           <p:cNvCxnSpPr/>
           <p:nvPr/>
         </p:nvCxnSpPr>
@@ -26105,7 +26168,7 @@
       </p:cxnSp>
       <p:cxnSp>
         <p:nvCxnSpPr>
-          <p:cNvPr id="262" name="Google Shape;262;gad8afea2a7_5_35"/>
+          <p:cNvPr id="258" name="Google Shape;258;gad8afea2a7_5_35"/>
           <p:cNvCxnSpPr/>
           <p:nvPr/>
         </p:nvCxnSpPr>
@@ -26131,7 +26194,7 @@
       </p:cxnSp>
       <p:cxnSp>
         <p:nvCxnSpPr>
-          <p:cNvPr id="263" name="Google Shape;263;gad8afea2a7_5_35"/>
+          <p:cNvPr id="259" name="Google Shape;259;gad8afea2a7_5_35"/>
           <p:cNvCxnSpPr/>
           <p:nvPr/>
         </p:nvCxnSpPr>
@@ -26157,7 +26220,7 @@
       </p:cxnSp>
       <p:cxnSp>
         <p:nvCxnSpPr>
-          <p:cNvPr id="264" name="Google Shape;264;gad8afea2a7_5_35"/>
+          <p:cNvPr id="260" name="Google Shape;260;gad8afea2a7_5_35"/>
           <p:cNvCxnSpPr/>
           <p:nvPr/>
         </p:nvCxnSpPr>
@@ -26183,7 +26246,7 @@
       </p:cxnSp>
       <p:cxnSp>
         <p:nvCxnSpPr>
-          <p:cNvPr id="265" name="Google Shape;265;gad8afea2a7_5_35"/>
+          <p:cNvPr id="261" name="Google Shape;261;gad8afea2a7_5_35"/>
           <p:cNvCxnSpPr/>
           <p:nvPr/>
         </p:nvCxnSpPr>
@@ -26209,7 +26272,7 @@
       </p:cxnSp>
       <p:cxnSp>
         <p:nvCxnSpPr>
-          <p:cNvPr id="266" name="Google Shape;266;gad8afea2a7_5_35"/>
+          <p:cNvPr id="262" name="Google Shape;262;gad8afea2a7_5_35"/>
           <p:cNvCxnSpPr/>
           <p:nvPr/>
         </p:nvCxnSpPr>
@@ -26235,7 +26298,7 @@
       </p:cxnSp>
       <p:cxnSp>
         <p:nvCxnSpPr>
-          <p:cNvPr id="267" name="Google Shape;267;gad8afea2a7_5_35"/>
+          <p:cNvPr id="263" name="Google Shape;263;gad8afea2a7_5_35"/>
           <p:cNvCxnSpPr/>
           <p:nvPr/>
         </p:nvCxnSpPr>
@@ -26261,7 +26324,7 @@
       </p:cxnSp>
       <p:sp>
         <p:nvSpPr>
-          <p:cNvPr id="268" name="Google Shape;268;gad8afea2a7_5_35"/>
+          <p:cNvPr id="264" name="Google Shape;264;gad8afea2a7_5_35"/>
           <p:cNvSpPr txBox="1"/>
           <p:nvPr/>
         </p:nvSpPr>
@@ -26358,7 +26421,7 @@
       </p:sp>
       <p:sp>
         <p:nvSpPr>
-          <p:cNvPr id="269" name="Google Shape;269;gad8afea2a7_5_35"/>
+          <p:cNvPr id="265" name="Google Shape;265;gad8afea2a7_5_35"/>
           <p:cNvSpPr txBox="1"/>
           <p:nvPr/>
         </p:nvSpPr>
@@ -26424,7 +26487,7 @@
       </p:sp>
       <p:cxnSp>
         <p:nvCxnSpPr>
-          <p:cNvPr id="270" name="Google Shape;270;gad8afea2a7_5_35"/>
+          <p:cNvPr id="266" name="Google Shape;266;gad8afea2a7_5_35"/>
           <p:cNvCxnSpPr/>
           <p:nvPr/>
         </p:nvCxnSpPr>
@@ -26450,7 +26513,7 @@
       </p:cxnSp>
       <p:sp>
         <p:nvSpPr>
-          <p:cNvPr id="271" name="Google Shape;271;gad8afea2a7_5_35"/>
+          <p:cNvPr id="267" name="Google Shape;267;gad8afea2a7_5_35"/>
           <p:cNvSpPr txBox="1"/>
           <p:nvPr/>
         </p:nvSpPr>
@@ -26522,7 +26585,7 @@
       </p:sp>
       <p:sp>
         <p:nvSpPr>
-          <p:cNvPr id="272" name="Google Shape;272;gad8afea2a7_5_35"/>
+          <p:cNvPr id="268" name="Google Shape;268;gad8afea2a7_5_35"/>
           <p:cNvSpPr txBox="1"/>
           <p:nvPr/>
         </p:nvSpPr>
@@ -26594,9 +26657,9 @@
       </p:sp>
       <p:cxnSp>
         <p:nvCxnSpPr>
-          <p:cNvPr id="273" name="Google Shape;273;gad8afea2a7_5_35"/>
+          <p:cNvPr id="269" name="Google Shape;269;gad8afea2a7_5_35"/>
           <p:cNvCxnSpPr>
-            <a:stCxn id="271" idx="2"/>
+            <a:stCxn id="267" idx="2"/>
           </p:cNvCxnSpPr>
           <p:nvPr/>
         </p:nvCxnSpPr>
@@ -26622,7 +26685,7 @@
       </p:cxnSp>
       <p:cxnSp>
         <p:nvCxnSpPr>
-          <p:cNvPr id="274" name="Google Shape;274;gad8afea2a7_5_35"/>
+          <p:cNvPr id="270" name="Google Shape;270;gad8afea2a7_5_35"/>
           <p:cNvCxnSpPr/>
           <p:nvPr/>
         </p:nvCxnSpPr>
@@ -26648,7 +26711,7 @@
       </p:cxnSp>
       <p:sp>
         <p:nvSpPr>
-          <p:cNvPr id="275" name="Google Shape;275;gad8afea2a7_5_35"/>
+          <p:cNvPr id="271" name="Google Shape;271;gad8afea2a7_5_35"/>
           <p:cNvSpPr/>
           <p:nvPr/>
         </p:nvSpPr>
@@ -26722,7 +26785,7 @@
       </p:sp>
       <p:sp>
         <p:nvSpPr>
-          <p:cNvPr id="276" name="Google Shape;276;gad8afea2a7_5_35"/>
+          <p:cNvPr id="272" name="Google Shape;272;gad8afea2a7_5_35"/>
           <p:cNvSpPr/>
           <p:nvPr/>
         </p:nvSpPr>
@@ -26836,7 +26899,7 @@
       </p:sp>
       <p:sp>
         <p:nvSpPr>
-          <p:cNvPr id="277" name="Google Shape;277;gad8afea2a7_5_35"/>
+          <p:cNvPr id="273" name="Google Shape;273;gad8afea2a7_5_35"/>
           <p:cNvSpPr/>
           <p:nvPr/>
         </p:nvSpPr>
@@ -26950,7 +27013,7 @@
       </p:sp>
       <p:sp>
         <p:nvSpPr>
-          <p:cNvPr id="278" name="Google Shape;278;gad8afea2a7_5_35"/>
+          <p:cNvPr id="274" name="Google Shape;274;gad8afea2a7_5_35"/>
           <p:cNvSpPr/>
           <p:nvPr/>
         </p:nvSpPr>
@@ -27024,7 +27087,7 @@
       </p:sp>
       <p:sp>
         <p:nvSpPr>
-          <p:cNvPr id="279" name="Google Shape;279;gad8afea2a7_5_35"/>
+          <p:cNvPr id="275" name="Google Shape;275;gad8afea2a7_5_35"/>
           <p:cNvSpPr/>
           <p:nvPr/>
         </p:nvSpPr>
@@ -27098,7 +27161,7 @@
       </p:sp>
       <p:sp>
         <p:nvSpPr>
-          <p:cNvPr id="280" name="Google Shape;280;gad8afea2a7_5_35"/>
+          <p:cNvPr id="276" name="Google Shape;276;gad8afea2a7_5_35"/>
           <p:cNvSpPr/>
           <p:nvPr/>
         </p:nvSpPr>
@@ -27212,7 +27275,7 @@
       </p:sp>
       <p:sp>
         <p:nvSpPr>
-          <p:cNvPr id="281" name="Google Shape;281;gad8afea2a7_5_35"/>
+          <p:cNvPr id="277" name="Google Shape;277;gad8afea2a7_5_35"/>
           <p:cNvSpPr txBox="1"/>
           <p:nvPr/>
         </p:nvSpPr>
@@ -27307,7 +27370,7 @@
   <p:cSld>
     <p:spTree>
       <p:nvGrpSpPr>
-        <p:cNvPr id="285" name="Shape 285"/>
+        <p:cNvPr id="281" name="Shape 281"/>
         <p:cNvGrpSpPr/>
         <p:nvPr/>
       </p:nvGrpSpPr>
@@ -27321,7 +27384,7 @@
       </p:grpSpPr>
       <p:sp>
         <p:nvSpPr>
-          <p:cNvPr id="286" name="Google Shape;286;ga57c1fc9d1_0_13"/>
+          <p:cNvPr id="282" name="Google Shape;282;ga57c1fc9d1_0_13"/>
           <p:cNvSpPr txBox="1"/>
           <p:nvPr>
             <p:ph idx="7" type="body"/>
@@ -27437,7 +27500,7 @@
       </p:sp>
       <p:sp>
         <p:nvSpPr>
-          <p:cNvPr id="287" name="Google Shape;287;ga57c1fc9d1_0_13"/>
+          <p:cNvPr id="283" name="Google Shape;283;ga57c1fc9d1_0_13"/>
           <p:cNvSpPr txBox="1"/>
           <p:nvPr/>
         </p:nvSpPr>
@@ -27515,7 +27578,7 @@
       </p:sp>
       <p:pic>
         <p:nvPicPr>
-          <p:cNvPr id="288" name="Google Shape;288;ga57c1fc9d1_0_13"/>
+          <p:cNvPr id="284" name="Google Shape;284;ga57c1fc9d1_0_13"/>
           <p:cNvPicPr preferRelativeResize="0"/>
           <p:nvPr/>
         </p:nvPicPr>
@@ -27553,7 +27616,7 @@
   <p:cSld>
     <p:spTree>
       <p:nvGrpSpPr>
-        <p:cNvPr id="292" name="Shape 292"/>
+        <p:cNvPr id="288" name="Shape 288"/>
         <p:cNvGrpSpPr/>
         <p:nvPr/>
       </p:nvGrpSpPr>
@@ -27567,7 +27630,7 @@
       </p:grpSpPr>
       <p:sp>
         <p:nvSpPr>
-          <p:cNvPr id="293" name="Google Shape;293;gad8afea2a7_5_95"/>
+          <p:cNvPr id="289" name="Google Shape;289;gad8afea2a7_5_95"/>
           <p:cNvSpPr txBox="1"/>
           <p:nvPr>
             <p:ph idx="7" type="body"/>
@@ -27683,7 +27746,7 @@
       </p:sp>
       <p:sp>
         <p:nvSpPr>
-          <p:cNvPr id="294" name="Google Shape;294;gad8afea2a7_5_95"/>
+          <p:cNvPr id="290" name="Google Shape;290;gad8afea2a7_5_95"/>
           <p:cNvSpPr txBox="1"/>
           <p:nvPr/>
         </p:nvSpPr>
@@ -27749,7 +27812,7 @@
       </p:sp>
       <p:pic>
         <p:nvPicPr>
-          <p:cNvPr id="295" name="Google Shape;295;gad8afea2a7_5_95"/>
+          <p:cNvPr id="291" name="Google Shape;291;gad8afea2a7_5_95"/>
           <p:cNvPicPr preferRelativeResize="0"/>
           <p:nvPr/>
         </p:nvPicPr>
@@ -27776,7 +27839,7 @@
       </p:pic>
       <p:sp>
         <p:nvSpPr>
-          <p:cNvPr id="296" name="Google Shape;296;gad8afea2a7_5_95"/>
+          <p:cNvPr id="292" name="Google Shape;292;gad8afea2a7_5_95"/>
           <p:cNvSpPr/>
           <p:nvPr/>
         </p:nvSpPr>
@@ -27841,7 +27904,7 @@
       </p:sp>
       <p:sp>
         <p:nvSpPr>
-          <p:cNvPr id="297" name="Google Shape;297;gad8afea2a7_5_95"/>
+          <p:cNvPr id="293" name="Google Shape;293;gad8afea2a7_5_95"/>
           <p:cNvSpPr/>
           <p:nvPr/>
         </p:nvSpPr>
@@ -27906,7 +27969,7 @@
       </p:sp>
       <p:sp>
         <p:nvSpPr>
-          <p:cNvPr id="298" name="Google Shape;298;gad8afea2a7_5_95"/>
+          <p:cNvPr id="294" name="Google Shape;294;gad8afea2a7_5_95"/>
           <p:cNvSpPr/>
           <p:nvPr/>
         </p:nvSpPr>
@@ -27971,7 +28034,7 @@
       </p:sp>
       <p:sp>
         <p:nvSpPr>
-          <p:cNvPr id="299" name="Google Shape;299;gad8afea2a7_5_95"/>
+          <p:cNvPr id="295" name="Google Shape;295;gad8afea2a7_5_95"/>
           <p:cNvSpPr/>
           <p:nvPr/>
         </p:nvSpPr>
@@ -28036,7 +28099,7 @@
       </p:sp>
       <p:sp>
         <p:nvSpPr>
-          <p:cNvPr id="300" name="Google Shape;300;gad8afea2a7_5_95"/>
+          <p:cNvPr id="296" name="Google Shape;296;gad8afea2a7_5_95"/>
           <p:cNvSpPr/>
           <p:nvPr/>
         </p:nvSpPr>
@@ -28101,7 +28164,7 @@
       </p:sp>
       <p:sp>
         <p:nvSpPr>
-          <p:cNvPr id="301" name="Google Shape;301;gad8afea2a7_5_95"/>
+          <p:cNvPr id="297" name="Google Shape;297;gad8afea2a7_5_95"/>
           <p:cNvSpPr/>
           <p:nvPr/>
         </p:nvSpPr>
@@ -28166,7 +28229,7 @@
       </p:sp>
       <p:sp>
         <p:nvSpPr>
-          <p:cNvPr id="302" name="Google Shape;302;gad8afea2a7_5_95"/>
+          <p:cNvPr id="298" name="Google Shape;298;gad8afea2a7_5_95"/>
           <p:cNvSpPr/>
           <p:nvPr/>
         </p:nvSpPr>
@@ -28231,7 +28294,7 @@
       </p:sp>
       <p:sp>
         <p:nvSpPr>
-          <p:cNvPr id="303" name="Google Shape;303;gad8afea2a7_5_95"/>
+          <p:cNvPr id="299" name="Google Shape;299;gad8afea2a7_5_95"/>
           <p:cNvSpPr/>
           <p:nvPr/>
         </p:nvSpPr>
@@ -28296,7 +28359,7 @@
       </p:sp>
       <p:sp>
         <p:nvSpPr>
-          <p:cNvPr id="304" name="Google Shape;304;gad8afea2a7_5_95"/>
+          <p:cNvPr id="300" name="Google Shape;300;gad8afea2a7_5_95"/>
           <p:cNvSpPr txBox="1"/>
           <p:nvPr/>
         </p:nvSpPr>
@@ -28404,7 +28467,7 @@
       </p:sp>
       <p:sp>
         <p:nvSpPr>
-          <p:cNvPr id="305" name="Google Shape;305;gad8afea2a7_5_95"/>
+          <p:cNvPr id="301" name="Google Shape;301;gad8afea2a7_5_95"/>
           <p:cNvSpPr txBox="1"/>
           <p:nvPr/>
         </p:nvSpPr>
@@ -28512,7 +28575,7 @@
       </p:sp>
       <p:sp>
         <p:nvSpPr>
-          <p:cNvPr id="306" name="Google Shape;306;gad8afea2a7_5_95"/>
+          <p:cNvPr id="302" name="Google Shape;302;gad8afea2a7_5_95"/>
           <p:cNvSpPr txBox="1"/>
           <p:nvPr/>
         </p:nvSpPr>
@@ -28620,10 +28683,10 @@
       </p:sp>
       <p:cxnSp>
         <p:nvCxnSpPr>
-          <p:cNvPr id="307" name="Google Shape;307;gad8afea2a7_5_95"/>
+          <p:cNvPr id="303" name="Google Shape;303;gad8afea2a7_5_95"/>
           <p:cNvCxnSpPr>
-            <a:stCxn id="306" idx="2"/>
-            <a:endCxn id="299" idx="0"/>
+            <a:stCxn id="302" idx="2"/>
+            <a:endCxn id="295" idx="0"/>
           </p:cNvCxnSpPr>
           <p:nvPr/>
         </p:nvCxnSpPr>
@@ -28649,9 +28712,9 @@
       </p:cxnSp>
       <p:cxnSp>
         <p:nvCxnSpPr>
-          <p:cNvPr id="308" name="Google Shape;308;gad8afea2a7_5_95"/>
+          <p:cNvPr id="304" name="Google Shape;304;gad8afea2a7_5_95"/>
           <p:cNvCxnSpPr>
-            <a:stCxn id="305" idx="2"/>
+            <a:stCxn id="301" idx="2"/>
           </p:cNvCxnSpPr>
           <p:nvPr/>
         </p:nvCxnSpPr>
@@ -28677,9 +28740,9 @@
       </p:cxnSp>
       <p:cxnSp>
         <p:nvCxnSpPr>
-          <p:cNvPr id="309" name="Google Shape;309;gad8afea2a7_5_95"/>
+          <p:cNvPr id="305" name="Google Shape;305;gad8afea2a7_5_95"/>
           <p:cNvCxnSpPr>
-            <a:stCxn id="305" idx="2"/>
+            <a:stCxn id="301" idx="2"/>
           </p:cNvCxnSpPr>
           <p:nvPr/>
         </p:nvCxnSpPr>
@@ -28705,9 +28768,9 @@
       </p:cxnSp>
       <p:cxnSp>
         <p:nvCxnSpPr>
-          <p:cNvPr id="310" name="Google Shape;310;gad8afea2a7_5_95"/>
+          <p:cNvPr id="306" name="Google Shape;306;gad8afea2a7_5_95"/>
           <p:cNvCxnSpPr>
-            <a:stCxn id="304" idx="0"/>
+            <a:stCxn id="300" idx="0"/>
           </p:cNvCxnSpPr>
           <p:nvPr/>
         </p:nvCxnSpPr>
@@ -28744,7 +28807,7 @@
   <p:cSld>
     <p:spTree>
       <p:nvGrpSpPr>
-        <p:cNvPr id="314" name="Shape 314"/>
+        <p:cNvPr id="310" name="Shape 310"/>
         <p:cNvGrpSpPr/>
         <p:nvPr/>
       </p:nvGrpSpPr>
@@ -28758,7 +28821,7 @@
       </p:grpSpPr>
       <p:pic>
         <p:nvPicPr>
-          <p:cNvPr id="315" name="Google Shape;315;gad8afea2a7_5_72"/>
+          <p:cNvPr id="311" name="Google Shape;311;gad8afea2a7_5_72"/>
           <p:cNvPicPr preferRelativeResize="0"/>
           <p:nvPr/>
         </p:nvPicPr>
@@ -28785,7 +28848,7 @@
       </p:pic>
       <p:sp>
         <p:nvSpPr>
-          <p:cNvPr id="316" name="Google Shape;316;gad8afea2a7_5_72"/>
+          <p:cNvPr id="312" name="Google Shape;312;gad8afea2a7_5_72"/>
           <p:cNvSpPr txBox="1"/>
           <p:nvPr>
             <p:ph idx="7" type="body"/>
@@ -28901,7 +28964,7 @@
       </p:sp>
       <p:sp>
         <p:nvSpPr>
-          <p:cNvPr id="317" name="Google Shape;317;gad8afea2a7_5_72"/>
+          <p:cNvPr id="313" name="Google Shape;313;gad8afea2a7_5_72"/>
           <p:cNvSpPr txBox="1"/>
           <p:nvPr/>
         </p:nvSpPr>
@@ -28979,7 +29042,7 @@
       </p:sp>
       <p:sp>
         <p:nvSpPr>
-          <p:cNvPr id="318" name="Google Shape;318;gad8afea2a7_5_72"/>
+          <p:cNvPr id="314" name="Google Shape;314;gad8afea2a7_5_72"/>
           <p:cNvSpPr/>
           <p:nvPr/>
         </p:nvSpPr>
@@ -29044,7 +29107,7 @@
       </p:sp>
       <p:sp>
         <p:nvSpPr>
-          <p:cNvPr id="319" name="Google Shape;319;gad8afea2a7_5_72"/>
+          <p:cNvPr id="315" name="Google Shape;315;gad8afea2a7_5_72"/>
           <p:cNvSpPr/>
           <p:nvPr/>
         </p:nvSpPr>
@@ -29109,7 +29172,7 @@
       </p:sp>
       <p:sp>
         <p:nvSpPr>
-          <p:cNvPr id="320" name="Google Shape;320;gad8afea2a7_5_72"/>
+          <p:cNvPr id="316" name="Google Shape;316;gad8afea2a7_5_72"/>
           <p:cNvSpPr/>
           <p:nvPr/>
         </p:nvSpPr>
@@ -29174,7 +29237,7 @@
       </p:sp>
       <p:sp>
         <p:nvSpPr>
-          <p:cNvPr id="321" name="Google Shape;321;gad8afea2a7_5_72"/>
+          <p:cNvPr id="317" name="Google Shape;317;gad8afea2a7_5_72"/>
           <p:cNvSpPr/>
           <p:nvPr/>
         </p:nvSpPr>
@@ -29239,7 +29302,7 @@
       </p:sp>
       <p:sp>
         <p:nvSpPr>
-          <p:cNvPr id="322" name="Google Shape;322;gad8afea2a7_5_72"/>
+          <p:cNvPr id="318" name="Google Shape;318;gad8afea2a7_5_72"/>
           <p:cNvSpPr txBox="1"/>
           <p:nvPr/>
         </p:nvSpPr>
@@ -29307,10 +29370,10 @@
       </p:sp>
       <p:cxnSp>
         <p:nvCxnSpPr>
-          <p:cNvPr id="323" name="Google Shape;323;gad8afea2a7_5_72"/>
+          <p:cNvPr id="319" name="Google Shape;319;gad8afea2a7_5_72"/>
           <p:cNvCxnSpPr>
-            <a:stCxn id="322" idx="2"/>
-            <a:endCxn id="321" idx="0"/>
+            <a:stCxn id="318" idx="2"/>
+            <a:endCxn id="317" idx="0"/>
           </p:cNvCxnSpPr>
           <p:nvPr/>
         </p:nvCxnSpPr>
@@ -29336,7 +29399,7 @@
       </p:cxnSp>
       <p:sp>
         <p:nvSpPr>
-          <p:cNvPr id="324" name="Google Shape;324;gad8afea2a7_5_72"/>
+          <p:cNvPr id="320" name="Google Shape;320;gad8afea2a7_5_72"/>
           <p:cNvSpPr txBox="1"/>
           <p:nvPr/>
         </p:nvSpPr>
@@ -29404,7 +29467,7 @@
       </p:sp>
       <p:cxnSp>
         <p:nvCxnSpPr>
-          <p:cNvPr id="325" name="Google Shape;325;gad8afea2a7_5_72"/>
+          <p:cNvPr id="321" name="Google Shape;321;gad8afea2a7_5_72"/>
           <p:cNvCxnSpPr/>
           <p:nvPr/>
         </p:nvCxnSpPr>
@@ -29430,10 +29493,10 @@
       </p:cxnSp>
       <p:cxnSp>
         <p:nvCxnSpPr>
-          <p:cNvPr id="326" name="Google Shape;326;gad8afea2a7_5_72"/>
+          <p:cNvPr id="322" name="Google Shape;322;gad8afea2a7_5_72"/>
           <p:cNvCxnSpPr>
-            <a:stCxn id="324" idx="2"/>
-            <a:endCxn id="319" idx="3"/>
+            <a:stCxn id="320" idx="2"/>
+            <a:endCxn id="315" idx="3"/>
           </p:cNvCxnSpPr>
           <p:nvPr/>
         </p:nvCxnSpPr>
@@ -29459,10 +29522,10 @@
       </p:cxnSp>
       <p:cxnSp>
         <p:nvCxnSpPr>
-          <p:cNvPr id="327" name="Google Shape;327;gad8afea2a7_5_72"/>
+          <p:cNvPr id="323" name="Google Shape;323;gad8afea2a7_5_72"/>
           <p:cNvCxnSpPr>
-            <a:stCxn id="324" idx="2"/>
-            <a:endCxn id="320" idx="1"/>
+            <a:stCxn id="320" idx="2"/>
+            <a:endCxn id="316" idx="1"/>
           </p:cNvCxnSpPr>
           <p:nvPr/>
         </p:nvCxnSpPr>
@@ -29499,7 +29562,7 @@
   <p:cSld>
     <p:spTree>
       <p:nvGrpSpPr>
-        <p:cNvPr id="332" name="Shape 332"/>
+        <p:cNvPr id="328" name="Shape 328"/>
         <p:cNvGrpSpPr/>
         <p:nvPr/>
       </p:nvGrpSpPr>
@@ -29513,7 +29576,7 @@
       </p:grpSpPr>
       <p:sp>
         <p:nvSpPr>
-          <p:cNvPr id="333" name="Google Shape;333;gad8afea2a7_4_0"/>
+          <p:cNvPr id="329" name="Google Shape;329;gad8afea2a7_4_0"/>
           <p:cNvSpPr txBox="1"/>
           <p:nvPr/>
         </p:nvSpPr>
@@ -29585,7 +29648,7 @@
       </p:sp>
       <p:sp>
         <p:nvSpPr>
-          <p:cNvPr id="334" name="Google Shape;334;gad8afea2a7_4_0"/>
+          <p:cNvPr id="330" name="Google Shape;330;gad8afea2a7_4_0"/>
           <p:cNvSpPr/>
           <p:nvPr/>
         </p:nvSpPr>
@@ -29699,9 +29762,9 @@
       </p:sp>
       <p:cxnSp>
         <p:nvCxnSpPr>
-          <p:cNvPr id="335" name="Google Shape;335;gad8afea2a7_4_0"/>
+          <p:cNvPr id="331" name="Google Shape;331;gad8afea2a7_4_0"/>
           <p:cNvCxnSpPr>
-            <a:stCxn id="333" idx="2"/>
+            <a:stCxn id="329" idx="2"/>
           </p:cNvCxnSpPr>
           <p:nvPr/>
         </p:nvCxnSpPr>
@@ -29727,7 +29790,7 @@
       </p:cxnSp>
       <p:cxnSp>
         <p:nvCxnSpPr>
-          <p:cNvPr id="336" name="Google Shape;336;gad8afea2a7_4_0"/>
+          <p:cNvPr id="332" name="Google Shape;332;gad8afea2a7_4_0"/>
           <p:cNvCxnSpPr/>
           <p:nvPr/>
         </p:nvCxnSpPr>
@@ -29753,7 +29816,7 @@
       </p:cxnSp>
       <p:sp>
         <p:nvSpPr>
-          <p:cNvPr id="337" name="Google Shape;337;gad8afea2a7_4_0"/>
+          <p:cNvPr id="333" name="Google Shape;333;gad8afea2a7_4_0"/>
           <p:cNvSpPr/>
           <p:nvPr/>
         </p:nvSpPr>
@@ -29827,7 +29890,7 @@
       </p:sp>
       <p:sp>
         <p:nvSpPr>
-          <p:cNvPr id="338" name="Google Shape;338;gad8afea2a7_4_0"/>
+          <p:cNvPr id="334" name="Google Shape;334;gad8afea2a7_4_0"/>
           <p:cNvSpPr/>
           <p:nvPr/>
         </p:nvSpPr>
@@ -29941,7 +30004,7 @@
       </p:sp>
       <p:sp>
         <p:nvSpPr>
-          <p:cNvPr id="339" name="Google Shape;339;gad8afea2a7_4_0"/>
+          <p:cNvPr id="335" name="Google Shape;335;gad8afea2a7_4_0"/>
           <p:cNvSpPr/>
           <p:nvPr/>
         </p:nvSpPr>
@@ -30055,7 +30118,7 @@
       </p:sp>
       <p:cxnSp>
         <p:nvCxnSpPr>
-          <p:cNvPr id="340" name="Google Shape;340;gad8afea2a7_4_0"/>
+          <p:cNvPr id="336" name="Google Shape;336;gad8afea2a7_4_0"/>
           <p:cNvCxnSpPr/>
           <p:nvPr/>
         </p:nvCxnSpPr>
@@ -30081,7 +30144,7 @@
       </p:cxnSp>
       <p:sp>
         <p:nvSpPr>
-          <p:cNvPr id="341" name="Google Shape;341;gad8afea2a7_4_0"/>
+          <p:cNvPr id="337" name="Google Shape;337;gad8afea2a7_4_0"/>
           <p:cNvSpPr txBox="1"/>
           <p:nvPr/>
         </p:nvSpPr>
@@ -30193,9 +30256,9 @@
       </p:sp>
       <p:cxnSp>
         <p:nvCxnSpPr>
-          <p:cNvPr id="342" name="Google Shape;342;gad8afea2a7_4_0"/>
+          <p:cNvPr id="338" name="Google Shape;338;gad8afea2a7_4_0"/>
           <p:cNvCxnSpPr>
-            <a:stCxn id="339" idx="0"/>
+            <a:stCxn id="335" idx="0"/>
           </p:cNvCxnSpPr>
           <p:nvPr/>
         </p:nvCxnSpPr>
@@ -30221,9 +30284,9 @@
       </p:cxnSp>
       <p:cxnSp>
         <p:nvCxnSpPr>
-          <p:cNvPr id="343" name="Google Shape;343;gad8afea2a7_4_0"/>
+          <p:cNvPr id="339" name="Google Shape;339;gad8afea2a7_4_0"/>
           <p:cNvCxnSpPr>
-            <a:endCxn id="344" idx="0"/>
+            <a:endCxn id="340" idx="0"/>
           </p:cNvCxnSpPr>
           <p:nvPr/>
         </p:nvCxnSpPr>
@@ -30249,7 +30312,7 @@
       </p:cxnSp>
       <p:sp>
         <p:nvSpPr>
-          <p:cNvPr id="344" name="Google Shape;344;gad8afea2a7_4_0"/>
+          <p:cNvPr id="340" name="Google Shape;340;gad8afea2a7_4_0"/>
           <p:cNvSpPr/>
           <p:nvPr/>
         </p:nvSpPr>
@@ -30323,7 +30386,7 @@
       </p:sp>
       <p:sp>
         <p:nvSpPr>
-          <p:cNvPr id="345" name="Google Shape;345;gad8afea2a7_4_0"/>
+          <p:cNvPr id="341" name="Google Shape;341;gad8afea2a7_4_0"/>
           <p:cNvSpPr txBox="1"/>
           <p:nvPr>
             <p:ph idx="7" type="body"/>
@@ -30487,124 +30550,284 @@
           </a:bodyPr>
           <a:lstStyle/>
           <a:p>
-            <a:pPr indent="0" lvl="0" marL="0" rtl="0" algn="l">
-              <a:spcBef>
-                <a:spcPts val="0"/>
-              </a:spcBef>
-              <a:spcAft>
-                <a:spcPts val="0"/>
-              </a:spcAft>
+            <a:pPr indent="0" lvl="0" marL="0" marR="0" rtl="0" algn="l">
+              <a:lnSpc>
+                <a:spcPct val="100000"/>
+              </a:lnSpc>
+              <a:spcBef>
+                <a:spcPts val="0"/>
+              </a:spcBef>
+              <a:spcAft>
+                <a:spcPts val="0"/>
+              </a:spcAft>
+              <a:buClr>
+                <a:srgbClr val="000000"/>
+              </a:buClr>
+              <a:buSzPts val="2000"/>
+              <a:buFont typeface="Arial"/>
               <a:buNone/>
             </a:pPr>
             <a:r>
-              <a:rPr b="1" lang="en-US" sz="2000"/>
+              <a:rPr b="1" i="0" lang="en-US" sz="2000" u="none" cap="none" strike="noStrike">
+                <a:solidFill>
+                  <a:srgbClr val="000000"/>
+                </a:solidFill>
+                <a:latin typeface="Arial"/>
+                <a:ea typeface="Arial"/>
+                <a:cs typeface="Arial"/>
+                <a:sym typeface="Arial"/>
+              </a:rPr>
               <a:t>Project name : </a:t>
             </a:r>
             <a:r>
-              <a:rPr lang="en-US" sz="2000"/>
+              <a:rPr b="0" i="0" lang="en-US" sz="2000" u="none" cap="none" strike="noStrike">
+                <a:solidFill>
+                  <a:srgbClr val="000000"/>
+                </a:solidFill>
+                <a:latin typeface="Arial"/>
+                <a:ea typeface="Arial"/>
+                <a:cs typeface="Arial"/>
+                <a:sym typeface="Arial"/>
+              </a:rPr>
               <a:t>Factory of the future</a:t>
             </a:r>
-            <a:endParaRPr sz="2000"/>
+            <a:endParaRPr b="0" i="0" sz="2000" u="none" cap="none" strike="noStrike">
+              <a:solidFill>
+                <a:srgbClr val="000000"/>
+              </a:solidFill>
+              <a:latin typeface="Arial"/>
+              <a:ea typeface="Arial"/>
+              <a:cs typeface="Arial"/>
+              <a:sym typeface="Arial"/>
+            </a:endParaRPr>
           </a:p>
           <a:p>
-            <a:pPr indent="0" lvl="0" marL="0" rtl="0" algn="l">
-              <a:spcBef>
-                <a:spcPts val="0"/>
-              </a:spcBef>
-              <a:spcAft>
-                <a:spcPts val="0"/>
-              </a:spcAft>
+            <a:pPr indent="0" lvl="0" marL="0" marR="0" rtl="0" algn="l">
+              <a:lnSpc>
+                <a:spcPct val="100000"/>
+              </a:lnSpc>
+              <a:spcBef>
+                <a:spcPts val="0"/>
+              </a:spcBef>
+              <a:spcAft>
+                <a:spcPts val="0"/>
+              </a:spcAft>
+              <a:buClr>
+                <a:srgbClr val="000000"/>
+              </a:buClr>
+              <a:buSzPts val="2000"/>
+              <a:buFont typeface="Arial"/>
               <a:buNone/>
             </a:pPr>
             <a:r>
               <a:t/>
             </a:r>
-            <a:endParaRPr sz="2000"/>
+            <a:endParaRPr b="0" i="0" sz="2000" u="none" cap="none" strike="noStrike">
+              <a:solidFill>
+                <a:srgbClr val="000000"/>
+              </a:solidFill>
+              <a:latin typeface="Arial"/>
+              <a:ea typeface="Arial"/>
+              <a:cs typeface="Arial"/>
+              <a:sym typeface="Arial"/>
+            </a:endParaRPr>
           </a:p>
           <a:p>
-            <a:pPr indent="0" lvl="0" marL="0" rtl="0" algn="l">
-              <a:spcBef>
-                <a:spcPts val="0"/>
-              </a:spcBef>
-              <a:spcAft>
-                <a:spcPts val="0"/>
-              </a:spcAft>
+            <a:pPr indent="0" lvl="0" marL="0" marR="0" rtl="0" algn="l">
+              <a:lnSpc>
+                <a:spcPct val="100000"/>
+              </a:lnSpc>
+              <a:spcBef>
+                <a:spcPts val="0"/>
+              </a:spcBef>
+              <a:spcAft>
+                <a:spcPts val="0"/>
+              </a:spcAft>
+              <a:buClr>
+                <a:srgbClr val="000000"/>
+              </a:buClr>
+              <a:buSzPts val="2000"/>
+              <a:buFont typeface="Arial"/>
               <a:buNone/>
             </a:pPr>
             <a:r>
-              <a:rPr b="1" lang="en-US" sz="2000"/>
+              <a:rPr b="1" i="0" lang="en-US" sz="2000" u="none" cap="none" strike="noStrike">
+                <a:solidFill>
+                  <a:srgbClr val="000000"/>
+                </a:solidFill>
+                <a:latin typeface="Arial"/>
+                <a:ea typeface="Arial"/>
+                <a:cs typeface="Arial"/>
+                <a:sym typeface="Arial"/>
+              </a:rPr>
               <a:t>Project goals : </a:t>
             </a:r>
             <a:r>
-              <a:rPr lang="en-US" sz="2000"/>
+              <a:rPr b="0" i="0" lang="en-US" sz="2000" u="none" cap="none" strike="noStrike">
+                <a:solidFill>
+                  <a:srgbClr val="000000"/>
+                </a:solidFill>
+                <a:latin typeface="Arial"/>
+                <a:ea typeface="Arial"/>
+                <a:cs typeface="Arial"/>
+                <a:sym typeface="Arial"/>
+              </a:rPr>
               <a:t>Deploy a system to monitor and control a finite set of factories remotely.</a:t>
             </a:r>
-            <a:endParaRPr sz="2000"/>
+            <a:endParaRPr b="0" i="0" sz="2000" u="none" cap="none" strike="noStrike">
+              <a:solidFill>
+                <a:srgbClr val="000000"/>
+              </a:solidFill>
+              <a:latin typeface="Arial"/>
+              <a:ea typeface="Arial"/>
+              <a:cs typeface="Arial"/>
+              <a:sym typeface="Arial"/>
+            </a:endParaRPr>
           </a:p>
           <a:p>
-            <a:pPr indent="0" lvl="0" marL="0" rtl="0" algn="l">
-              <a:spcBef>
-                <a:spcPts val="0"/>
-              </a:spcBef>
-              <a:spcAft>
-                <a:spcPts val="0"/>
-              </a:spcAft>
+            <a:pPr indent="0" lvl="0" marL="0" marR="0" rtl="0" algn="l">
+              <a:lnSpc>
+                <a:spcPct val="100000"/>
+              </a:lnSpc>
+              <a:spcBef>
+                <a:spcPts val="0"/>
+              </a:spcBef>
+              <a:spcAft>
+                <a:spcPts val="0"/>
+              </a:spcAft>
+              <a:buClr>
+                <a:srgbClr val="000000"/>
+              </a:buClr>
+              <a:buSzPts val="2000"/>
+              <a:buFont typeface="Arial"/>
               <a:buNone/>
             </a:pPr>
             <a:r>
               <a:t/>
             </a:r>
-            <a:endParaRPr sz="2000"/>
+            <a:endParaRPr b="0" i="0" sz="2000" u="none" cap="none" strike="noStrike">
+              <a:solidFill>
+                <a:srgbClr val="000000"/>
+              </a:solidFill>
+              <a:latin typeface="Arial"/>
+              <a:ea typeface="Arial"/>
+              <a:cs typeface="Arial"/>
+              <a:sym typeface="Arial"/>
+            </a:endParaRPr>
           </a:p>
           <a:p>
-            <a:pPr indent="0" lvl="0" marL="0" rtl="0" algn="just">
-              <a:spcBef>
-                <a:spcPts val="0"/>
-              </a:spcBef>
-              <a:spcAft>
-                <a:spcPts val="0"/>
-              </a:spcAft>
+            <a:pPr indent="0" lvl="0" marL="0" marR="0" rtl="0" algn="just">
+              <a:lnSpc>
+                <a:spcPct val="100000"/>
+              </a:lnSpc>
+              <a:spcBef>
+                <a:spcPts val="0"/>
+              </a:spcBef>
+              <a:spcAft>
+                <a:spcPts val="0"/>
+              </a:spcAft>
+              <a:buClr>
+                <a:srgbClr val="000000"/>
+              </a:buClr>
+              <a:buSzPts val="2000"/>
+              <a:buFont typeface="Arial"/>
               <a:buNone/>
             </a:pPr>
             <a:r>
-              <a:rPr b="1" lang="en-US" sz="2000"/>
+              <a:rPr b="1" i="0" lang="en-US" sz="2000" u="none" cap="none" strike="noStrike">
+                <a:solidFill>
+                  <a:srgbClr val="000000"/>
+                </a:solidFill>
+                <a:latin typeface="Arial"/>
+                <a:ea typeface="Arial"/>
+                <a:cs typeface="Arial"/>
+                <a:sym typeface="Arial"/>
+              </a:rPr>
               <a:t>Description: </a:t>
             </a:r>
             <a:r>
-              <a:rPr lang="en-US" sz="2000"/>
+              <a:rPr b="0" i="0" lang="en-US" sz="2000" u="none" cap="none" strike="noStrike">
+                <a:solidFill>
+                  <a:srgbClr val="000000"/>
+                </a:solidFill>
+                <a:latin typeface="Arial"/>
+                <a:ea typeface="Arial"/>
+                <a:cs typeface="Arial"/>
+                <a:sym typeface="Arial"/>
+              </a:rPr>
               <a:t>This project will consider two different factories. Factory ‘Le Monde’ and ‘Chocolatine’. Both factories will be monitored thanks to a redundant system of three environmental sensors. After merging the data of the sensors using a clustering algorithm, it is sent to a server which is in charge of storing the information and send it back to a remote display and to a prediction block. The server also sends data back to the factories regarding the state of two actuators: a fan and a LED.</a:t>
             </a:r>
-            <a:endParaRPr sz="2000"/>
+            <a:endParaRPr b="0" i="0" sz="2000" u="none" cap="none" strike="noStrike">
+              <a:solidFill>
+                <a:srgbClr val="000000"/>
+              </a:solidFill>
+              <a:latin typeface="Arial"/>
+              <a:ea typeface="Arial"/>
+              <a:cs typeface="Arial"/>
+              <a:sym typeface="Arial"/>
+            </a:endParaRPr>
           </a:p>
           <a:p>
-            <a:pPr indent="0" lvl="0" marL="0" rtl="0" algn="l">
-              <a:spcBef>
-                <a:spcPts val="0"/>
-              </a:spcBef>
-              <a:spcAft>
-                <a:spcPts val="0"/>
-              </a:spcAft>
+            <a:pPr indent="0" lvl="0" marL="0" marR="0" rtl="0" algn="l">
+              <a:lnSpc>
+                <a:spcPct val="100000"/>
+              </a:lnSpc>
+              <a:spcBef>
+                <a:spcPts val="0"/>
+              </a:spcBef>
+              <a:spcAft>
+                <a:spcPts val="0"/>
+              </a:spcAft>
+              <a:buClr>
+                <a:srgbClr val="000000"/>
+              </a:buClr>
+              <a:buSzPts val="2000"/>
+              <a:buFont typeface="Arial"/>
               <a:buNone/>
             </a:pPr>
             <a:r>
               <a:t/>
             </a:r>
-            <a:endParaRPr sz="2000"/>
+            <a:endParaRPr b="0" i="0" sz="2000" u="none" cap="none" strike="noStrike">
+              <a:solidFill>
+                <a:srgbClr val="000000"/>
+              </a:solidFill>
+              <a:latin typeface="Arial"/>
+              <a:ea typeface="Arial"/>
+              <a:cs typeface="Arial"/>
+              <a:sym typeface="Arial"/>
+            </a:endParaRPr>
           </a:p>
           <a:p>
-            <a:pPr indent="0" lvl="0" marL="0" rtl="0" algn="l">
-              <a:spcBef>
-                <a:spcPts val="0"/>
-              </a:spcBef>
-              <a:spcAft>
-                <a:spcPts val="0"/>
-              </a:spcAft>
+            <a:pPr indent="0" lvl="0" marL="0" marR="0" rtl="0" algn="l">
+              <a:lnSpc>
+                <a:spcPct val="100000"/>
+              </a:lnSpc>
+              <a:spcBef>
+                <a:spcPts val="0"/>
+              </a:spcBef>
+              <a:spcAft>
+                <a:spcPts val="0"/>
+              </a:spcAft>
+              <a:buClr>
+                <a:srgbClr val="000000"/>
+              </a:buClr>
+              <a:buSzPts val="2000"/>
+              <a:buFont typeface="Arial"/>
               <a:buNone/>
             </a:pPr>
             <a:r>
               <a:t/>
             </a:r>
-            <a:endParaRPr sz="2000"/>
+            <a:endParaRPr b="0" i="0" sz="2000" u="none" cap="none" strike="noStrike">
+              <a:solidFill>
+                <a:srgbClr val="000000"/>
+              </a:solidFill>
+              <a:latin typeface="Arial"/>
+              <a:ea typeface="Arial"/>
+              <a:cs typeface="Arial"/>
+              <a:sym typeface="Arial"/>
+            </a:endParaRPr>
           </a:p>
         </p:txBody>
       </p:sp>
@@ -30737,7 +30960,7 @@
   <p:cSld>
     <p:spTree>
       <p:nvGrpSpPr>
-        <p:cNvPr id="350" name="Shape 350"/>
+        <p:cNvPr id="346" name="Shape 346"/>
         <p:cNvGrpSpPr/>
         <p:nvPr/>
       </p:nvGrpSpPr>
@@ -30751,7 +30974,7 @@
       </p:grpSpPr>
       <p:sp>
         <p:nvSpPr>
-          <p:cNvPr id="351" name="Google Shape;351;gaf59b23b9b_2_0"/>
+          <p:cNvPr id="347" name="Google Shape;347;gaf59b23b9b_2_0"/>
           <p:cNvSpPr txBox="1"/>
           <p:nvPr>
             <p:ph idx="4" type="body"/>
@@ -30765,6 +30988,10 @@
           <a:prstGeom prst="rect">
             <a:avLst/>
           </a:prstGeom>
+          <a:noFill/>
+          <a:ln>
+            <a:noFill/>
+          </a:ln>
         </p:spPr>
         <p:txBody>
           <a:bodyPr anchorCtr="0" anchor="t" bIns="91425" lIns="91425" spcFirstLastPara="1" rIns="91425" wrap="square" tIns="91425">
@@ -30773,12 +31000,16 @@
           <a:lstStyle/>
           <a:p>
             <a:pPr indent="0" lvl="0" marL="0" rtl="0" algn="ctr">
+              <a:lnSpc>
+                <a:spcPct val="90000"/>
+              </a:lnSpc>
               <a:spcBef>
                 <a:spcPts val="1000"/>
               </a:spcBef>
               <a:spcAft>
                 <a:spcPts val="0"/>
               </a:spcAft>
+              <a:buSzPts val="900"/>
               <a:buNone/>
             </a:pPr>
             <a:r>
@@ -30790,7 +31021,7 @@
       </p:sp>
       <p:sp>
         <p:nvSpPr>
-          <p:cNvPr id="352" name="Google Shape;352;gaf59b23b9b_2_0"/>
+          <p:cNvPr id="348" name="Google Shape;348;gaf59b23b9b_2_0"/>
           <p:cNvSpPr txBox="1"/>
           <p:nvPr>
             <p:ph idx="5" type="body"/>
@@ -30804,6 +31035,10 @@
           <a:prstGeom prst="rect">
             <a:avLst/>
           </a:prstGeom>
+          <a:noFill/>
+          <a:ln>
+            <a:noFill/>
+          </a:ln>
         </p:spPr>
         <p:txBody>
           <a:bodyPr anchorCtr="0" anchor="t" bIns="91425" lIns="91425" spcFirstLastPara="1" rIns="91425" wrap="square" tIns="91425">
@@ -30812,12 +31047,16 @@
           <a:lstStyle/>
           <a:p>
             <a:pPr indent="0" lvl="0" marL="0" rtl="0" algn="ctr">
+              <a:lnSpc>
+                <a:spcPct val="90000"/>
+              </a:lnSpc>
               <a:spcBef>
                 <a:spcPts val="1000"/>
               </a:spcBef>
               <a:spcAft>
                 <a:spcPts val="0"/>
               </a:spcAft>
+              <a:buSzPts val="900"/>
               <a:buNone/>
             </a:pPr>
             <a:r>
@@ -30829,17 +31068,16 @@
       </p:sp>
       <p:pic>
         <p:nvPicPr>
-          <p:cNvPr id="353" name="Google Shape;353;gaf59b23b9b_2_0"/>
+          <p:cNvPr id="349" name="Google Shape;349;gaf59b23b9b_2_0"/>
           <p:cNvPicPr preferRelativeResize="0"/>
           <p:nvPr/>
         </p:nvPicPr>
-        <p:blipFill>
+        <p:blipFill rotWithShape="1">
           <a:blip r:embed="rId3">
             <a:alphaModFix/>
           </a:blip>
-          <a:stretch>
-            <a:fillRect/>
-          </a:stretch>
+          <a:srcRect b="0" l="0" r="0" t="0"/>
+          <a:stretch/>
         </p:blipFill>
         <p:spPr>
           <a:xfrm>
@@ -30857,7 +31095,7 @@
       </p:pic>
       <p:sp>
         <p:nvSpPr>
-          <p:cNvPr id="354" name="Google Shape;354;gaf59b23b9b_2_0"/>
+          <p:cNvPr id="350" name="Google Shape;350;gaf59b23b9b_2_0"/>
           <p:cNvSpPr txBox="1"/>
           <p:nvPr>
             <p:ph idx="7" type="body"/>
@@ -30984,7 +31222,7 @@
   <p:cSld>
     <p:spTree>
       <p:nvGrpSpPr>
-        <p:cNvPr id="359" name="Shape 359"/>
+        <p:cNvPr id="355" name="Shape 355"/>
         <p:cNvGrpSpPr/>
         <p:nvPr/>
       </p:nvGrpSpPr>
@@ -30998,7 +31236,7 @@
       </p:grpSpPr>
       <p:sp>
         <p:nvSpPr>
-          <p:cNvPr id="360" name="Google Shape;360;gad8afea2a7_3_0"/>
+          <p:cNvPr id="356" name="Google Shape;356;gad8afea2a7_3_0"/>
           <p:cNvSpPr txBox="1"/>
           <p:nvPr>
             <p:ph idx="2" type="body"/>
@@ -31315,7 +31553,7 @@
       </p:sp>
       <p:sp>
         <p:nvSpPr>
-          <p:cNvPr id="361" name="Google Shape;361;gad8afea2a7_3_0"/>
+          <p:cNvPr id="357" name="Google Shape;357;gad8afea2a7_3_0"/>
           <p:cNvSpPr txBox="1"/>
           <p:nvPr>
             <p:ph idx="7" type="body"/>
@@ -31442,7 +31680,7 @@
   <p:cSld>
     <p:spTree>
       <p:nvGrpSpPr>
-        <p:cNvPr id="366" name="Shape 366"/>
+        <p:cNvPr id="362" name="Shape 362"/>
         <p:cNvGrpSpPr/>
         <p:nvPr/>
       </p:nvGrpSpPr>
@@ -31456,7 +31694,7 @@
       </p:grpSpPr>
       <p:sp>
         <p:nvSpPr>
-          <p:cNvPr id="367" name="Google Shape;367;gad8afea2a7_3_13"/>
+          <p:cNvPr id="363" name="Google Shape;363;gad8afea2a7_3_13"/>
           <p:cNvSpPr txBox="1"/>
           <p:nvPr>
             <p:ph idx="2" type="body"/>
@@ -31826,7 +32064,7 @@
       </p:sp>
       <p:sp>
         <p:nvSpPr>
-          <p:cNvPr id="368" name="Google Shape;368;gad8afea2a7_3_13"/>
+          <p:cNvPr id="364" name="Google Shape;364;gad8afea2a7_3_13"/>
           <p:cNvSpPr txBox="1"/>
           <p:nvPr>
             <p:ph idx="7" type="body"/>
@@ -31953,7 +32191,7 @@
   <p:cSld>
     <p:spTree>
       <p:nvGrpSpPr>
-        <p:cNvPr id="373" name="Shape 373"/>
+        <p:cNvPr id="369" name="Shape 369"/>
         <p:cNvGrpSpPr/>
         <p:nvPr/>
       </p:nvGrpSpPr>
@@ -31967,7 +32205,7 @@
       </p:grpSpPr>
       <p:sp>
         <p:nvSpPr>
-          <p:cNvPr id="374" name="Google Shape;374;gad8afea2a7_3_26"/>
+          <p:cNvPr id="370" name="Google Shape;370;gad8afea2a7_3_26"/>
           <p:cNvSpPr txBox="1"/>
           <p:nvPr>
             <p:ph idx="2" type="body"/>
@@ -32204,7 +32442,7 @@
       </p:sp>
       <p:sp>
         <p:nvSpPr>
-          <p:cNvPr id="375" name="Google Shape;375;gad8afea2a7_3_26"/>
+          <p:cNvPr id="371" name="Google Shape;371;gad8afea2a7_3_26"/>
           <p:cNvSpPr txBox="1"/>
           <p:nvPr>
             <p:ph idx="7" type="body"/>
@@ -32331,7 +32569,7 @@
   <p:cSld>
     <p:spTree>
       <p:nvGrpSpPr>
-        <p:cNvPr id="380" name="Shape 380"/>
+        <p:cNvPr id="376" name="Shape 376"/>
         <p:cNvGrpSpPr/>
         <p:nvPr/>
       </p:nvGrpSpPr>
@@ -32345,7 +32583,7 @@
       </p:grpSpPr>
       <p:sp>
         <p:nvSpPr>
-          <p:cNvPr id="381" name="Google Shape;381;gad8afea2a7_3_39"/>
+          <p:cNvPr id="377" name="Google Shape;377;gad8afea2a7_3_39"/>
           <p:cNvSpPr txBox="1"/>
           <p:nvPr>
             <p:ph idx="1" type="body"/>
@@ -32392,7 +32630,7 @@
       </p:sp>
       <p:sp>
         <p:nvSpPr>
-          <p:cNvPr id="382" name="Google Shape;382;gad8afea2a7_3_39"/>
+          <p:cNvPr id="378" name="Google Shape;378;gad8afea2a7_3_39"/>
           <p:cNvSpPr txBox="1"/>
           <p:nvPr>
             <p:ph idx="2" type="body"/>
@@ -32439,7 +32677,7 @@
       </p:sp>
       <p:sp>
         <p:nvSpPr>
-          <p:cNvPr id="383" name="Google Shape;383;gad8afea2a7_3_39"/>
+          <p:cNvPr id="379" name="Google Shape;379;gad8afea2a7_3_39"/>
           <p:cNvSpPr txBox="1"/>
           <p:nvPr>
             <p:ph idx="3" type="body"/>
@@ -32486,7 +32724,7 @@
       </p:sp>
       <p:sp>
         <p:nvSpPr>
-          <p:cNvPr id="384" name="Google Shape;384;gad8afea2a7_3_39"/>
+          <p:cNvPr id="380" name="Google Shape;380;gad8afea2a7_3_39"/>
           <p:cNvSpPr txBox="1"/>
           <p:nvPr>
             <p:ph idx="4" type="body"/>
@@ -32533,7 +32771,7 @@
       </p:sp>
       <p:sp>
         <p:nvSpPr>
-          <p:cNvPr id="385" name="Google Shape;385;gad8afea2a7_3_39"/>
+          <p:cNvPr id="381" name="Google Shape;381;gad8afea2a7_3_39"/>
           <p:cNvSpPr txBox="1"/>
           <p:nvPr>
             <p:ph idx="5" type="body"/>
@@ -32580,7 +32818,7 @@
       </p:sp>
       <p:sp>
         <p:nvSpPr>
-          <p:cNvPr id="386" name="Google Shape;386;gad8afea2a7_3_39"/>
+          <p:cNvPr id="382" name="Google Shape;382;gad8afea2a7_3_39"/>
           <p:cNvSpPr txBox="1"/>
           <p:nvPr>
             <p:ph idx="6" type="body"/>
@@ -32627,7 +32865,7 @@
       </p:sp>
       <p:sp>
         <p:nvSpPr>
-          <p:cNvPr id="387" name="Google Shape;387;gad8afea2a7_3_39"/>
+          <p:cNvPr id="383" name="Google Shape;383;gad8afea2a7_3_39"/>
           <p:cNvSpPr txBox="1"/>
           <p:nvPr>
             <p:ph idx="7" type="body"/>
@@ -32674,7 +32912,7 @@
       </p:sp>
       <p:sp>
         <p:nvSpPr>
-          <p:cNvPr id="388" name="Google Shape;388;gad8afea2a7_3_39"/>
+          <p:cNvPr id="384" name="Google Shape;384;gad8afea2a7_3_39"/>
           <p:cNvSpPr txBox="1"/>
           <p:nvPr/>
         </p:nvSpPr>
@@ -32778,7 +33016,7 @@
             <a:tbl>
               <a:tblPr>
                 <a:noFill/>
-                <a:tableStyleId>{B895A0AA-BC11-43DB-B029-78B20C21FCE0}</a:tableStyleId>
+                <a:tableStyleId>{34E47581-5A05-40A9-B148-7E3A70507CE9}</a:tableStyleId>
               </a:tblPr>
               <a:tblGrid>
                 <a:gridCol w="4953000"/>
@@ -32790,19 +33028,27 @@
                     <a:bodyPr/>
                     <a:lstStyle/>
                     <a:p>
-                      <a:pPr indent="0" lvl="0" marL="0" rtl="0" algn="l">
+                      <a:pPr indent="0" lvl="0" marL="0" marR="0" rtl="0" algn="l">
+                        <a:lnSpc>
+                          <a:spcPct val="100000"/>
+                        </a:lnSpc>
                         <a:spcBef>
                           <a:spcPts val="0"/>
                         </a:spcBef>
                         <a:spcAft>
                           <a:spcPts val="0"/>
                         </a:spcAft>
+                        <a:buClr>
+                          <a:srgbClr val="000000"/>
+                        </a:buClr>
+                        <a:buSzPts val="1400"/>
+                        <a:buFont typeface="Arial"/>
                         <a:buNone/>
                       </a:pPr>
                       <a:r>
                         <a:t/>
                       </a:r>
-                      <a:endParaRPr/>
+                      <a:endParaRPr sz="1400" u="none" cap="none" strike="noStrike"/>
                     </a:p>
                   </a:txBody>
                   <a:tcPr marT="91425" marB="91425" marR="91425" marL="91425"/>
@@ -32812,19 +33058,27 @@
                     <a:bodyPr/>
                     <a:lstStyle/>
                     <a:p>
-                      <a:pPr indent="0" lvl="0" marL="0" rtl="0" algn="l">
+                      <a:pPr indent="0" lvl="0" marL="0" marR="0" rtl="0" algn="l">
+                        <a:lnSpc>
+                          <a:spcPct val="100000"/>
+                        </a:lnSpc>
                         <a:spcBef>
                           <a:spcPts val="0"/>
                         </a:spcBef>
                         <a:spcAft>
                           <a:spcPts val="0"/>
                         </a:spcAft>
+                        <a:buClr>
+                          <a:srgbClr val="000000"/>
+                        </a:buClr>
+                        <a:buSzPts val="1400"/>
+                        <a:buFont typeface="Arial"/>
                         <a:buNone/>
                       </a:pPr>
                       <a:r>
                         <a:t/>
                       </a:r>
-                      <a:endParaRPr/>
+                      <a:endParaRPr sz="1400" u="none" cap="none" strike="noStrike"/>
                     </a:p>
                   </a:txBody>
                   <a:tcPr marT="91425" marB="91425" marR="91425" marL="91425"/>
@@ -32840,13 +33094,12 @@
           <p:cNvPicPr preferRelativeResize="0"/>
           <p:nvPr/>
         </p:nvPicPr>
-        <p:blipFill>
+        <p:blipFill rotWithShape="1">
           <a:blip r:embed="rId3">
             <a:alphaModFix/>
           </a:blip>
-          <a:stretch>
-            <a:fillRect/>
-          </a:stretch>
+          <a:srcRect b="0" l="0" r="0" t="0"/>
+          <a:stretch/>
         </p:blipFill>
         <p:spPr>
           <a:xfrm>
@@ -32868,13 +33121,12 @@
           <p:cNvPicPr preferRelativeResize="0"/>
           <p:nvPr/>
         </p:nvPicPr>
-        <p:blipFill>
+        <p:blipFill rotWithShape="1">
           <a:blip r:embed="rId4">
             <a:alphaModFix/>
           </a:blip>
-          <a:stretch>
-            <a:fillRect/>
-          </a:stretch>
+          <a:srcRect b="0" l="0" r="0" t="0"/>
+          <a:stretch/>
         </p:blipFill>
         <p:spPr>
           <a:xfrm>
@@ -32900,7 +33152,7 @@
           <a:blip r:embed="rId5">
             <a:alphaModFix/>
           </a:blip>
-          <a:srcRect b="19355" l="18028" r="21247" t="18187"/>
+          <a:srcRect b="19355" l="18027" r="21247" t="18187"/>
           <a:stretch/>
         </p:blipFill>
         <p:spPr>
@@ -32923,13 +33175,12 @@
           <p:cNvPicPr preferRelativeResize="0"/>
           <p:nvPr/>
         </p:nvPicPr>
-        <p:blipFill>
+        <p:blipFill rotWithShape="1">
           <a:blip r:embed="rId6">
             <a:alphaModFix/>
           </a:blip>
-          <a:stretch>
-            <a:fillRect/>
-          </a:stretch>
+          <a:srcRect b="0" l="0" r="0" t="0"/>
+          <a:stretch/>
         </p:blipFill>
         <p:spPr>
           <a:xfrm>
@@ -33086,7 +33337,7 @@
           </a:bodyPr>
           <a:lstStyle/>
           <a:p>
-            <a:pPr indent="0" lvl="0" marL="0" rtl="0" algn="ctr">
+            <a:pPr indent="0" lvl="0" marL="0" marR="0" rtl="0" algn="ctr">
               <a:lnSpc>
                 <a:spcPct val="90000"/>
               </a:lnSpc>
@@ -33096,10 +33347,15 @@
               <a:spcAft>
                 <a:spcPts val="0"/>
               </a:spcAft>
+              <a:buClr>
+                <a:srgbClr val="000000"/>
+              </a:buClr>
+              <a:buSzPts val="1800"/>
+              <a:buFont typeface="Arial"/>
               <a:buNone/>
             </a:pPr>
             <a:r>
-              <a:rPr b="1" lang="en-US" sz="1800" u="sng">
+              <a:rPr b="1" i="0" lang="en-US" sz="1800" u="sng" cap="none" strike="noStrike">
                 <a:solidFill>
                   <a:schemeClr val="dk1"/>
                 </a:solidFill>
@@ -33110,7 +33366,7 @@
               </a:rPr>
               <a:t>IoT</a:t>
             </a:r>
-            <a:endParaRPr b="1" sz="1800" u="sng">
+            <a:endParaRPr b="1" i="0" sz="1800" u="sng" cap="none" strike="noStrike">
               <a:solidFill>
                 <a:schemeClr val="dk1"/>
               </a:solidFill>
@@ -33121,7 +33377,7 @@
             </a:endParaRPr>
           </a:p>
           <a:p>
-            <a:pPr indent="0" lvl="0" marL="0" rtl="0" algn="l">
+            <a:pPr indent="0" lvl="0" marL="0" marR="0" rtl="0" algn="l">
               <a:lnSpc>
                 <a:spcPct val="70000"/>
               </a:lnSpc>
@@ -33131,24 +33387,37 @@
               <a:spcAft>
                 <a:spcPts val="0"/>
               </a:spcAft>
+              <a:buClr>
+                <a:srgbClr val="000000"/>
+              </a:buClr>
+              <a:buSzPts val="1800"/>
+              <a:buFont typeface="Arial"/>
               <a:buNone/>
             </a:pPr>
             <a:r>
-              <a:rPr b="1" lang="en-US" sz="1800">
-                <a:solidFill>
-                  <a:schemeClr val="dk1"/>
-                </a:solidFill>
+              <a:rPr b="1" i="0" lang="en-US" sz="1800" u="none" cap="none" strike="noStrike">
+                <a:solidFill>
+                  <a:schemeClr val="dk1"/>
+                </a:solidFill>
+                <a:latin typeface="Arial"/>
+                <a:ea typeface="Arial"/>
+                <a:cs typeface="Arial"/>
+                <a:sym typeface="Arial"/>
               </a:rPr>
               <a:t>Bernardo Sata</a:t>
             </a:r>
-            <a:endParaRPr b="1" sz="1800">
+            <a:endParaRPr b="1" i="0" sz="1800" u="none" cap="none" strike="noStrike">
               <a:solidFill>
                 <a:schemeClr val="dk1"/>
               </a:solidFill>
+              <a:latin typeface="Arial"/>
+              <a:ea typeface="Arial"/>
+              <a:cs typeface="Arial"/>
+              <a:sym typeface="Arial"/>
             </a:endParaRPr>
           </a:p>
           <a:p>
-            <a:pPr indent="0" lvl="0" marL="0" rtl="0" algn="l">
+            <a:pPr indent="0" lvl="0" marL="0" marR="0" rtl="0" algn="l">
               <a:lnSpc>
                 <a:spcPct val="70000"/>
               </a:lnSpc>
@@ -33166,14 +33435,26 @@
               <a:buNone/>
             </a:pPr>
             <a:r>
-              <a:rPr b="1" lang="en-US" sz="1800">
-                <a:solidFill>
-                  <a:schemeClr val="dk1"/>
-                </a:solidFill>
+              <a:rPr b="1" i="0" lang="en-US" sz="1800" u="none" cap="none" strike="noStrike">
+                <a:solidFill>
+                  <a:schemeClr val="dk1"/>
+                </a:solidFill>
+                <a:latin typeface="Arial"/>
+                <a:ea typeface="Arial"/>
+                <a:cs typeface="Arial"/>
+                <a:sym typeface="Arial"/>
               </a:rPr>
               <a:t>Gonçalo Fontes Neves</a:t>
             </a:r>
-            <a:endParaRPr/>
+            <a:endParaRPr b="0" i="0" sz="1400" u="none" cap="none" strike="noStrike">
+              <a:solidFill>
+                <a:srgbClr val="000000"/>
+              </a:solidFill>
+              <a:latin typeface="Arial"/>
+              <a:ea typeface="Arial"/>
+              <a:cs typeface="Arial"/>
+              <a:sym typeface="Arial"/>
+            </a:endParaRPr>
           </a:p>
         </p:txBody>
       </p:sp>
@@ -33202,7 +33483,7 @@
           </a:bodyPr>
           <a:lstStyle/>
           <a:p>
-            <a:pPr indent="0" lvl="0" marL="0" rtl="0" algn="ctr">
+            <a:pPr indent="0" lvl="0" marL="0" marR="0" rtl="0" algn="ctr">
               <a:lnSpc>
                 <a:spcPct val="90000"/>
               </a:lnSpc>
@@ -33212,10 +33493,15 @@
               <a:spcAft>
                 <a:spcPts val="0"/>
               </a:spcAft>
+              <a:buClr>
+                <a:srgbClr val="000000"/>
+              </a:buClr>
+              <a:buSzPts val="1800"/>
+              <a:buFont typeface="Arial"/>
               <a:buNone/>
             </a:pPr>
             <a:r>
-              <a:rPr b="1" lang="en-US" sz="1800" u="sng">
+              <a:rPr b="1" i="0" lang="en-US" sz="1800" u="sng" cap="none" strike="noStrike">
                 <a:solidFill>
                   <a:schemeClr val="dk1"/>
                 </a:solidFill>
@@ -33226,7 +33512,7 @@
               </a:rPr>
               <a:t>Data Management</a:t>
             </a:r>
-            <a:endParaRPr b="1" sz="1800" u="sng">
+            <a:endParaRPr b="1" i="0" sz="1800" u="sng" cap="none" strike="noStrike">
               <a:solidFill>
                 <a:schemeClr val="dk1"/>
               </a:solidFill>
@@ -33237,7 +33523,7 @@
             </a:endParaRPr>
           </a:p>
           <a:p>
-            <a:pPr indent="0" lvl="0" marL="0" rtl="0" algn="l">
+            <a:pPr indent="0" lvl="0" marL="0" marR="0" rtl="0" algn="l">
               <a:lnSpc>
                 <a:spcPct val="70000"/>
               </a:lnSpc>
@@ -33247,24 +33533,37 @@
               <a:spcAft>
                 <a:spcPts val="0"/>
               </a:spcAft>
+              <a:buClr>
+                <a:srgbClr val="000000"/>
+              </a:buClr>
+              <a:buSzPts val="1800"/>
+              <a:buFont typeface="Arial"/>
               <a:buNone/>
             </a:pPr>
             <a:r>
-              <a:rPr b="1" lang="en-US" sz="1800">
-                <a:solidFill>
-                  <a:schemeClr val="dk1"/>
-                </a:solidFill>
+              <a:rPr b="1" i="0" lang="en-US" sz="1800" u="none" cap="none" strike="noStrike">
+                <a:solidFill>
+                  <a:schemeClr val="dk1"/>
+                </a:solidFill>
+                <a:latin typeface="Arial"/>
+                <a:ea typeface="Arial"/>
+                <a:cs typeface="Arial"/>
+                <a:sym typeface="Arial"/>
               </a:rPr>
               <a:t>Alberto Gonzalez</a:t>
             </a:r>
-            <a:endParaRPr b="1" sz="1800">
+            <a:endParaRPr b="1" i="0" sz="1800" u="none" cap="none" strike="noStrike">
               <a:solidFill>
                 <a:schemeClr val="dk1"/>
               </a:solidFill>
+              <a:latin typeface="Arial"/>
+              <a:ea typeface="Arial"/>
+              <a:cs typeface="Arial"/>
+              <a:sym typeface="Arial"/>
             </a:endParaRPr>
           </a:p>
           <a:p>
-            <a:pPr indent="0" lvl="0" marL="0" rtl="0" algn="l">
+            <a:pPr indent="0" lvl="0" marL="0" marR="0" rtl="0" algn="l">
               <a:lnSpc>
                 <a:spcPct val="70000"/>
               </a:lnSpc>
@@ -33274,20 +33573,33 @@
               <a:spcAft>
                 <a:spcPts val="0"/>
               </a:spcAft>
+              <a:buClr>
+                <a:srgbClr val="000000"/>
+              </a:buClr>
+              <a:buSzPts val="1800"/>
+              <a:buFont typeface="Arial"/>
               <a:buNone/>
             </a:pPr>
             <a:r>
-              <a:rPr b="1" lang="en-US" sz="1800">
-                <a:solidFill>
-                  <a:schemeClr val="dk1"/>
-                </a:solidFill>
+              <a:rPr b="1" i="0" lang="en-US" sz="1800" u="none" cap="none" strike="noStrike">
+                <a:solidFill>
+                  <a:schemeClr val="dk1"/>
+                </a:solidFill>
+                <a:latin typeface="Arial"/>
+                <a:ea typeface="Arial"/>
+                <a:cs typeface="Arial"/>
+                <a:sym typeface="Arial"/>
               </a:rPr>
               <a:t>Seungah Lee</a:t>
             </a:r>
-            <a:endParaRPr b="1" sz="1800">
+            <a:endParaRPr b="1" i="0" sz="1800" u="none" cap="none" strike="noStrike">
               <a:solidFill>
                 <a:schemeClr val="dk1"/>
               </a:solidFill>
+              <a:latin typeface="Arial"/>
+              <a:ea typeface="Arial"/>
+              <a:cs typeface="Arial"/>
+              <a:sym typeface="Arial"/>
             </a:endParaRPr>
           </a:p>
         </p:txBody>
@@ -33317,7 +33629,7 @@
           </a:bodyPr>
           <a:lstStyle/>
           <a:p>
-            <a:pPr indent="0" lvl="0" marL="0" rtl="0" algn="ctr">
+            <a:pPr indent="0" lvl="0" marL="0" marR="0" rtl="0" algn="ctr">
               <a:lnSpc>
                 <a:spcPct val="90000"/>
               </a:lnSpc>
@@ -33327,10 +33639,15 @@
               <a:spcAft>
                 <a:spcPts val="0"/>
               </a:spcAft>
+              <a:buClr>
+                <a:srgbClr val="000000"/>
+              </a:buClr>
+              <a:buSzPts val="1800"/>
+              <a:buFont typeface="Arial"/>
               <a:buNone/>
             </a:pPr>
             <a:r>
-              <a:rPr b="1" lang="en-US" sz="1800" u="sng">
+              <a:rPr b="1" i="0" lang="en-US" sz="1800" u="sng" cap="none" strike="noStrike">
                 <a:solidFill>
                   <a:schemeClr val="dk1"/>
                 </a:solidFill>
@@ -33341,7 +33658,7 @@
               </a:rPr>
               <a:t>AI</a:t>
             </a:r>
-            <a:endParaRPr b="1" sz="1800" u="sng">
+            <a:endParaRPr b="1" i="0" sz="1800" u="sng" cap="none" strike="noStrike">
               <a:solidFill>
                 <a:schemeClr val="dk1"/>
               </a:solidFill>
@@ -33352,7 +33669,7 @@
             </a:endParaRPr>
           </a:p>
           <a:p>
-            <a:pPr indent="0" lvl="0" marL="0" rtl="0" algn="l">
+            <a:pPr indent="0" lvl="0" marL="0" marR="0" rtl="0" algn="l">
               <a:lnSpc>
                 <a:spcPct val="70000"/>
               </a:lnSpc>
@@ -33362,24 +33679,37 @@
               <a:spcAft>
                 <a:spcPts val="0"/>
               </a:spcAft>
+              <a:buClr>
+                <a:srgbClr val="000000"/>
+              </a:buClr>
+              <a:buSzPts val="1800"/>
+              <a:buFont typeface="Arial"/>
               <a:buNone/>
             </a:pPr>
             <a:r>
-              <a:rPr b="1" lang="en-US" sz="1800">
-                <a:solidFill>
-                  <a:schemeClr val="dk1"/>
-                </a:solidFill>
+              <a:rPr b="1" i="0" lang="en-US" sz="1800" u="none" cap="none" strike="noStrike">
+                <a:solidFill>
+                  <a:schemeClr val="dk1"/>
+                </a:solidFill>
+                <a:latin typeface="Arial"/>
+                <a:ea typeface="Arial"/>
+                <a:cs typeface="Arial"/>
+                <a:sym typeface="Arial"/>
               </a:rPr>
               <a:t>Brian Franklin</a:t>
             </a:r>
-            <a:endParaRPr b="1" sz="1800">
+            <a:endParaRPr b="1" i="0" sz="1800" u="none" cap="none" strike="noStrike">
               <a:solidFill>
                 <a:schemeClr val="dk1"/>
               </a:solidFill>
+              <a:latin typeface="Arial"/>
+              <a:ea typeface="Arial"/>
+              <a:cs typeface="Arial"/>
+              <a:sym typeface="Arial"/>
             </a:endParaRPr>
           </a:p>
           <a:p>
-            <a:pPr indent="0" lvl="0" marL="0" rtl="0" algn="l">
+            <a:pPr indent="0" lvl="0" marL="0" marR="0" rtl="0" algn="l">
               <a:lnSpc>
                 <a:spcPct val="70000"/>
               </a:lnSpc>
@@ -33389,24 +33719,37 @@
               <a:spcAft>
                 <a:spcPts val="0"/>
               </a:spcAft>
+              <a:buClr>
+                <a:srgbClr val="000000"/>
+              </a:buClr>
+              <a:buSzPts val="1800"/>
+              <a:buFont typeface="Arial"/>
               <a:buNone/>
             </a:pPr>
             <a:r>
-              <a:rPr b="1" lang="en-US" sz="1800">
-                <a:solidFill>
-                  <a:schemeClr val="dk1"/>
-                </a:solidFill>
+              <a:rPr b="1" i="0" lang="en-US" sz="1800" u="none" cap="none" strike="noStrike">
+                <a:solidFill>
+                  <a:schemeClr val="dk1"/>
+                </a:solidFill>
+                <a:latin typeface="Arial"/>
+                <a:ea typeface="Arial"/>
+                <a:cs typeface="Arial"/>
+                <a:sym typeface="Arial"/>
               </a:rPr>
               <a:t>Mohamed Eltablawy</a:t>
             </a:r>
-            <a:endParaRPr b="1" sz="1800">
+            <a:endParaRPr b="1" i="0" sz="1800" u="none" cap="none" strike="noStrike">
               <a:solidFill>
                 <a:schemeClr val="dk1"/>
               </a:solidFill>
+              <a:latin typeface="Arial"/>
+              <a:ea typeface="Arial"/>
+              <a:cs typeface="Arial"/>
+              <a:sym typeface="Arial"/>
             </a:endParaRPr>
           </a:p>
           <a:p>
-            <a:pPr indent="0" lvl="0" marL="0" rtl="0" algn="l">
+            <a:pPr indent="0" lvl="0" marL="0" marR="0" rtl="0" algn="l">
               <a:lnSpc>
                 <a:spcPct val="70000"/>
               </a:lnSpc>
@@ -33416,24 +33759,37 @@
               <a:spcAft>
                 <a:spcPts val="0"/>
               </a:spcAft>
+              <a:buClr>
+                <a:srgbClr val="000000"/>
+              </a:buClr>
+              <a:buSzPts val="1800"/>
+              <a:buFont typeface="Arial"/>
               <a:buNone/>
             </a:pPr>
             <a:r>
-              <a:rPr b="1" lang="en-US" sz="1800">
-                <a:solidFill>
-                  <a:schemeClr val="dk1"/>
-                </a:solidFill>
+              <a:rPr b="1" i="0" lang="en-US" sz="1800" u="none" cap="none" strike="noStrike">
+                <a:solidFill>
+                  <a:schemeClr val="dk1"/>
+                </a:solidFill>
+                <a:latin typeface="Arial"/>
+                <a:ea typeface="Arial"/>
+                <a:cs typeface="Arial"/>
+                <a:sym typeface="Arial"/>
               </a:rPr>
               <a:t>Adrien Mencik</a:t>
             </a:r>
-            <a:endParaRPr b="1" sz="1800">
+            <a:endParaRPr b="1" i="0" sz="1800" u="none" cap="none" strike="noStrike">
               <a:solidFill>
                 <a:schemeClr val="dk1"/>
               </a:solidFill>
+              <a:latin typeface="Arial"/>
+              <a:ea typeface="Arial"/>
+              <a:cs typeface="Arial"/>
+              <a:sym typeface="Arial"/>
             </a:endParaRPr>
           </a:p>
           <a:p>
-            <a:pPr indent="0" lvl="0" marL="0" rtl="0" algn="l">
+            <a:pPr indent="0" lvl="0" marL="0" marR="0" rtl="0" algn="l">
               <a:lnSpc>
                 <a:spcPct val="90000"/>
               </a:lnSpc>
@@ -33443,15 +33799,24 @@
               <a:spcAft>
                 <a:spcPts val="0"/>
               </a:spcAft>
+              <a:buClr>
+                <a:srgbClr val="000000"/>
+              </a:buClr>
+              <a:buSzPts val="1800"/>
+              <a:buFont typeface="Arial"/>
               <a:buNone/>
             </a:pPr>
             <a:r>
               <a:t/>
             </a:r>
-            <a:endParaRPr b="1" sz="1800">
+            <a:endParaRPr b="1" i="0" sz="1800" u="none" cap="none" strike="noStrike">
               <a:solidFill>
                 <a:schemeClr val="dk1"/>
               </a:solidFill>
+              <a:latin typeface="Arial"/>
+              <a:ea typeface="Arial"/>
+              <a:cs typeface="Arial"/>
+              <a:sym typeface="Arial"/>
             </a:endParaRPr>
           </a:p>
         </p:txBody>
@@ -33481,7 +33846,7 @@
           </a:bodyPr>
           <a:lstStyle/>
           <a:p>
-            <a:pPr indent="0" lvl="0" marL="0" rtl="0" algn="ctr">
+            <a:pPr indent="0" lvl="0" marL="0" marR="0" rtl="0" algn="ctr">
               <a:lnSpc>
                 <a:spcPct val="90000"/>
               </a:lnSpc>
@@ -33491,10 +33856,15 @@
               <a:spcAft>
                 <a:spcPts val="0"/>
               </a:spcAft>
+              <a:buClr>
+                <a:srgbClr val="000000"/>
+              </a:buClr>
+              <a:buSzPts val="1800"/>
+              <a:buFont typeface="Arial"/>
               <a:buNone/>
             </a:pPr>
             <a:r>
-              <a:rPr b="1" lang="en-US" sz="1800" u="sng">
+              <a:rPr b="1" i="0" lang="en-US" sz="1800" u="sng" cap="none" strike="noStrike">
                 <a:solidFill>
                   <a:schemeClr val="dk1"/>
                 </a:solidFill>
@@ -33505,7 +33875,7 @@
               </a:rPr>
               <a:t>GUI</a:t>
             </a:r>
-            <a:endParaRPr b="1" sz="1800" u="sng">
+            <a:endParaRPr b="1" i="0" sz="1800" u="sng" cap="none" strike="noStrike">
               <a:solidFill>
                 <a:schemeClr val="dk1"/>
               </a:solidFill>
@@ -33516,7 +33886,7 @@
             </a:endParaRPr>
           </a:p>
           <a:p>
-            <a:pPr indent="0" lvl="0" marL="0" rtl="0" algn="l">
+            <a:pPr indent="0" lvl="0" marL="0" marR="0" rtl="0" algn="l">
               <a:lnSpc>
                 <a:spcPct val="70000"/>
               </a:lnSpc>
@@ -33526,24 +33896,37 @@
               <a:spcAft>
                 <a:spcPts val="0"/>
               </a:spcAft>
+              <a:buClr>
+                <a:srgbClr val="000000"/>
+              </a:buClr>
+              <a:buSzPts val="1800"/>
+              <a:buFont typeface="Arial"/>
               <a:buNone/>
             </a:pPr>
             <a:r>
-              <a:rPr b="1" lang="en-US" sz="1800">
-                <a:solidFill>
-                  <a:schemeClr val="dk1"/>
-                </a:solidFill>
+              <a:rPr b="1" i="0" lang="en-US" sz="1800" u="none" cap="none" strike="noStrike">
+                <a:solidFill>
+                  <a:schemeClr val="dk1"/>
+                </a:solidFill>
+                <a:latin typeface="Arial"/>
+                <a:ea typeface="Arial"/>
+                <a:cs typeface="Arial"/>
+                <a:sym typeface="Arial"/>
               </a:rPr>
               <a:t>Gabriella Catalan</a:t>
             </a:r>
-            <a:endParaRPr b="1" sz="1800">
+            <a:endParaRPr b="1" i="0" sz="1800" u="none" cap="none" strike="noStrike">
               <a:solidFill>
                 <a:schemeClr val="dk1"/>
               </a:solidFill>
+              <a:latin typeface="Arial"/>
+              <a:ea typeface="Arial"/>
+              <a:cs typeface="Arial"/>
+              <a:sym typeface="Arial"/>
             </a:endParaRPr>
           </a:p>
           <a:p>
-            <a:pPr indent="0" lvl="0" marL="0" rtl="0" algn="l">
+            <a:pPr indent="0" lvl="0" marL="0" marR="0" rtl="0" algn="l">
               <a:lnSpc>
                 <a:spcPct val="70000"/>
               </a:lnSpc>
@@ -33553,24 +33936,37 @@
               <a:spcAft>
                 <a:spcPts val="0"/>
               </a:spcAft>
+              <a:buClr>
+                <a:srgbClr val="000000"/>
+              </a:buClr>
+              <a:buSzPts val="1800"/>
+              <a:buFont typeface="Arial"/>
               <a:buNone/>
             </a:pPr>
             <a:r>
-              <a:rPr b="1" lang="en-US" sz="1800">
-                <a:solidFill>
-                  <a:schemeClr val="dk1"/>
-                </a:solidFill>
+              <a:rPr b="1" i="0" lang="en-US" sz="1800" u="none" cap="none" strike="noStrike">
+                <a:solidFill>
+                  <a:schemeClr val="dk1"/>
+                </a:solidFill>
+                <a:latin typeface="Arial"/>
+                <a:ea typeface="Arial"/>
+                <a:cs typeface="Arial"/>
+                <a:sym typeface="Arial"/>
               </a:rPr>
               <a:t>Aizar Berlanga</a:t>
             </a:r>
-            <a:endParaRPr b="1" sz="1800">
+            <a:endParaRPr b="1" i="0" sz="1800" u="none" cap="none" strike="noStrike">
               <a:solidFill>
                 <a:schemeClr val="dk1"/>
               </a:solidFill>
+              <a:latin typeface="Arial"/>
+              <a:ea typeface="Arial"/>
+              <a:cs typeface="Arial"/>
+              <a:sym typeface="Arial"/>
             </a:endParaRPr>
           </a:p>
           <a:p>
-            <a:pPr indent="0" lvl="0" marL="0" rtl="0" algn="l">
+            <a:pPr indent="0" lvl="0" marL="0" marR="0" rtl="0" algn="l">
               <a:lnSpc>
                 <a:spcPct val="70000"/>
               </a:lnSpc>
@@ -33580,15 +33976,24 @@
               <a:spcAft>
                 <a:spcPts val="0"/>
               </a:spcAft>
+              <a:buClr>
+                <a:srgbClr val="000000"/>
+              </a:buClr>
+              <a:buSzPts val="1800"/>
+              <a:buFont typeface="Arial"/>
               <a:buNone/>
             </a:pPr>
             <a:r>
               <a:t/>
             </a:r>
-            <a:endParaRPr b="1" sz="1800">
+            <a:endParaRPr b="1" i="0" sz="1800" u="none" cap="none" strike="noStrike">
               <a:solidFill>
                 <a:schemeClr val="dk1"/>
               </a:solidFill>
+              <a:latin typeface="Arial"/>
+              <a:ea typeface="Arial"/>
+              <a:cs typeface="Arial"/>
+              <a:sym typeface="Arial"/>
             </a:endParaRPr>
           </a:p>
         </p:txBody>
@@ -33624,13 +34029,12 @@
           <p:cNvPicPr preferRelativeResize="0"/>
           <p:nvPr/>
         </p:nvPicPr>
-        <p:blipFill>
+        <p:blipFill rotWithShape="1">
           <a:blip r:embed="rId3">
             <a:alphaModFix/>
           </a:blip>
-          <a:stretch>
-            <a:fillRect/>
-          </a:stretch>
+          <a:srcRect b="0" l="0" r="0" t="0"/>
+          <a:stretch/>
         </p:blipFill>
         <p:spPr>
           <a:xfrm>
@@ -33652,13 +34056,12 @@
           <p:cNvPicPr preferRelativeResize="0"/>
           <p:nvPr/>
         </p:nvPicPr>
-        <p:blipFill>
+        <p:blipFill rotWithShape="1">
           <a:blip r:embed="rId3">
             <a:alphaModFix/>
           </a:blip>
-          <a:stretch>
-            <a:fillRect/>
-          </a:stretch>
+          <a:srcRect b="0" l="0" r="0" t="0"/>
+          <a:stretch/>
         </p:blipFill>
         <p:spPr>
           <a:xfrm>
@@ -33684,7 +34087,7 @@
           <a:blip r:embed="rId4">
             <a:alphaModFix/>
           </a:blip>
-          <a:srcRect b="44020" l="27693" r="27196" t="9715"/>
+          <a:srcRect b="44019" l="27693" r="27196" t="9714"/>
           <a:stretch/>
         </p:blipFill>
         <p:spPr>
@@ -33707,13 +34110,12 @@
           <p:cNvPicPr preferRelativeResize="0"/>
           <p:nvPr/>
         </p:nvPicPr>
-        <p:blipFill>
+        <p:blipFill rotWithShape="1">
           <a:blip r:embed="rId3">
             <a:alphaModFix/>
           </a:blip>
-          <a:stretch>
-            <a:fillRect/>
-          </a:stretch>
+          <a:srcRect b="0" l="0" r="0" t="0"/>
+          <a:stretch/>
         </p:blipFill>
         <p:spPr>
           <a:xfrm>
@@ -33740,7 +34142,7 @@
         </p:nvCxnSpPr>
         <p:spPr>
           <a:xfrm flipH="1" rot="10800000">
-            <a:off x="3586000" y="2515659"/>
+            <a:off x="3585999" y="2515660"/>
             <a:ext cx="3182700" cy="270000"/>
           </a:xfrm>
           <a:prstGeom prst="straightConnector1">
@@ -33753,7 +34155,7 @@
             </a:solidFill>
             <a:prstDash val="solid"/>
             <a:round/>
-            <a:headEnd len="med" w="med" type="none"/>
+            <a:headEnd len="sm" w="sm" type="none"/>
             <a:tailEnd len="med" w="med" type="triangle"/>
           </a:ln>
         </p:spPr>
@@ -33769,7 +34171,7 @@
         </p:nvCxnSpPr>
         <p:spPr>
           <a:xfrm flipH="1" rot="10800000">
-            <a:off x="3586000" y="2515706"/>
+            <a:off x="3585999" y="2515706"/>
             <a:ext cx="3182700" cy="2911800"/>
           </a:xfrm>
           <a:prstGeom prst="straightConnector1">
@@ -33782,7 +34184,7 @@
             </a:solidFill>
             <a:prstDash val="solid"/>
             <a:round/>
-            <a:headEnd len="med" w="med" type="none"/>
+            <a:headEnd len="sm" w="sm" type="none"/>
             <a:tailEnd len="med" w="med" type="triangle"/>
           </a:ln>
         </p:spPr>
@@ -33797,7 +34199,7 @@
         </p:nvCxnSpPr>
         <p:spPr>
           <a:xfrm flipH="1">
-            <a:off x="3586000" y="2518359"/>
+            <a:off x="3585999" y="2518360"/>
             <a:ext cx="3202500" cy="267300"/>
           </a:xfrm>
           <a:prstGeom prst="straightConnector1">
@@ -33810,7 +34212,7 @@
             </a:solidFill>
             <a:prstDash val="solid"/>
             <a:round/>
-            <a:headEnd len="med" w="med" type="none"/>
+            <a:headEnd len="sm" w="sm" type="none"/>
             <a:tailEnd len="med" w="med" type="triangle"/>
           </a:ln>
         </p:spPr>
@@ -33826,7 +34228,7 @@
         </p:nvCxnSpPr>
         <p:spPr>
           <a:xfrm flipH="1">
-            <a:off x="3586087" y="2515709"/>
+            <a:off x="3586087" y="2515710"/>
             <a:ext cx="3182700" cy="2911800"/>
           </a:xfrm>
           <a:prstGeom prst="straightConnector1">
@@ -33839,7 +34241,7 @@
             </a:solidFill>
             <a:prstDash val="solid"/>
             <a:round/>
-            <a:headEnd len="med" w="med" type="none"/>
+            <a:headEnd len="sm" w="sm" type="none"/>
             <a:tailEnd len="med" w="med" type="triangle"/>
           </a:ln>
         </p:spPr>
@@ -33869,17 +34271,28 @@
           </a:bodyPr>
           <a:lstStyle/>
           <a:p>
-            <a:pPr indent="0" lvl="0" marL="0" rtl="0" algn="ctr">
-              <a:spcBef>
-                <a:spcPts val="0"/>
-              </a:spcBef>
-              <a:spcAft>
-                <a:spcPts val="0"/>
-              </a:spcAft>
+            <a:pPr indent="0" lvl="0" marL="0" marR="0" rtl="0" algn="ctr">
+              <a:lnSpc>
+                <a:spcPct val="100000"/>
+              </a:lnSpc>
+              <a:spcBef>
+                <a:spcPts val="0"/>
+              </a:spcBef>
+              <a:spcAft>
+                <a:spcPts val="0"/>
+              </a:spcAft>
+              <a:buClr>
+                <a:srgbClr val="000000"/>
+              </a:buClr>
+              <a:buSzPts val="1400"/>
+              <a:buFont typeface="Arial"/>
               <a:buNone/>
             </a:pPr>
             <a:r>
-              <a:rPr lang="en-US">
+              <a:rPr b="0" i="0" lang="en-US" sz="1400" u="none" cap="none" strike="noStrike">
+                <a:solidFill>
+                  <a:srgbClr val="000000"/>
+                </a:solidFill>
                 <a:latin typeface="Montserrat SemiBold"/>
                 <a:ea typeface="Montserrat SemiBold"/>
                 <a:cs typeface="Montserrat SemiBold"/>
@@ -33887,7 +34300,10 @@
               </a:rPr>
               <a:t>Factory Le Monde</a:t>
             </a:r>
-            <a:endParaRPr>
+            <a:endParaRPr b="0" i="0" sz="1400" u="none" cap="none" strike="noStrike">
+              <a:solidFill>
+                <a:srgbClr val="000000"/>
+              </a:solidFill>
               <a:latin typeface="Montserrat SemiBold"/>
               <a:ea typeface="Montserrat SemiBold"/>
               <a:cs typeface="Montserrat SemiBold"/>
@@ -33906,7 +34322,7 @@
           <a:blip r:embed="rId4">
             <a:alphaModFix/>
           </a:blip>
-          <a:srcRect b="44020" l="27693" r="27196" t="9715"/>
+          <a:srcRect b="44019" l="27693" r="27196" t="9714"/>
           <a:stretch/>
         </p:blipFill>
         <p:spPr>
@@ -33948,17 +34364,28 @@
           </a:bodyPr>
           <a:lstStyle/>
           <a:p>
-            <a:pPr indent="0" lvl="0" marL="0" rtl="0" algn="ctr">
-              <a:spcBef>
-                <a:spcPts val="0"/>
-              </a:spcBef>
-              <a:spcAft>
-                <a:spcPts val="0"/>
-              </a:spcAft>
+            <a:pPr indent="0" lvl="0" marL="0" marR="0" rtl="0" algn="ctr">
+              <a:lnSpc>
+                <a:spcPct val="100000"/>
+              </a:lnSpc>
+              <a:spcBef>
+                <a:spcPts val="0"/>
+              </a:spcBef>
+              <a:spcAft>
+                <a:spcPts val="0"/>
+              </a:spcAft>
+              <a:buClr>
+                <a:srgbClr val="000000"/>
+              </a:buClr>
+              <a:buSzPts val="1400"/>
+              <a:buFont typeface="Arial"/>
               <a:buNone/>
             </a:pPr>
             <a:r>
-              <a:rPr lang="en-US">
+              <a:rPr b="0" i="0" lang="en-US" sz="1400" u="none" cap="none" strike="noStrike">
+                <a:solidFill>
+                  <a:srgbClr val="000000"/>
+                </a:solidFill>
                 <a:latin typeface="Montserrat SemiBold"/>
                 <a:ea typeface="Montserrat SemiBold"/>
                 <a:cs typeface="Montserrat SemiBold"/>
@@ -33966,7 +34393,10 @@
               </a:rPr>
               <a:t>Factory Chocolatine</a:t>
             </a:r>
-            <a:endParaRPr>
+            <a:endParaRPr b="0" i="0" sz="1400" u="none" cap="none" strike="noStrike">
+              <a:solidFill>
+                <a:srgbClr val="000000"/>
+              </a:solidFill>
               <a:latin typeface="Montserrat SemiBold"/>
               <a:ea typeface="Montserrat SemiBold"/>
               <a:cs typeface="Montserrat SemiBold"/>
@@ -33985,7 +34415,7 @@
           <a:blip r:embed="rId4">
             <a:alphaModFix/>
           </a:blip>
-          <a:srcRect b="44020" l="27693" r="27196" t="9715"/>
+          <a:srcRect b="44019" l="27693" r="27196" t="9714"/>
           <a:stretch/>
         </p:blipFill>
         <p:spPr>
@@ -34012,7 +34442,7 @@
           <a:blip r:embed="rId4">
             <a:alphaModFix/>
           </a:blip>
-          <a:srcRect b="44020" l="27693" r="27196" t="9715"/>
+          <a:srcRect b="44019" l="27693" r="27196" t="9714"/>
           <a:stretch/>
         </p:blipFill>
         <p:spPr>
@@ -34039,7 +34469,7 @@
           <a:blip r:embed="rId4">
             <a:alphaModFix/>
           </a:blip>
-          <a:srcRect b="44020" l="27693" r="27196" t="9715"/>
+          <a:srcRect b="44019" l="27693" r="27196" t="9714"/>
           <a:stretch/>
         </p:blipFill>
         <p:spPr>
@@ -34066,7 +34496,7 @@
           <a:blip r:embed="rId4">
             <a:alphaModFix/>
           </a:blip>
-          <a:srcRect b="44020" l="27693" r="27196" t="9715"/>
+          <a:srcRect b="44019" l="27693" r="27196" t="9714"/>
           <a:stretch/>
         </p:blipFill>
         <p:spPr>
@@ -34108,17 +34538,28 @@
           </a:bodyPr>
           <a:lstStyle/>
           <a:p>
-            <a:pPr indent="0" lvl="0" marL="0" rtl="0" algn="ctr">
-              <a:spcBef>
-                <a:spcPts val="0"/>
-              </a:spcBef>
-              <a:spcAft>
-                <a:spcPts val="0"/>
-              </a:spcAft>
+            <a:pPr indent="0" lvl="0" marL="0" marR="0" rtl="0" algn="ctr">
+              <a:lnSpc>
+                <a:spcPct val="100000"/>
+              </a:lnSpc>
+              <a:spcBef>
+                <a:spcPts val="0"/>
+              </a:spcBef>
+              <a:spcAft>
+                <a:spcPts val="0"/>
+              </a:spcAft>
+              <a:buClr>
+                <a:srgbClr val="000000"/>
+              </a:buClr>
+              <a:buSzPts val="1400"/>
+              <a:buFont typeface="Arial"/>
               <a:buNone/>
             </a:pPr>
             <a:r>
-              <a:rPr lang="en-US">
+              <a:rPr b="0" i="0" lang="en-US" sz="1400" u="none" cap="none" strike="noStrike">
+                <a:solidFill>
+                  <a:srgbClr val="000000"/>
+                </a:solidFill>
                 <a:latin typeface="Montserrat SemiBold"/>
                 <a:ea typeface="Montserrat SemiBold"/>
                 <a:cs typeface="Montserrat SemiBold"/>
@@ -34126,7 +34567,10 @@
               </a:rPr>
               <a:t>Server </a:t>
             </a:r>
-            <a:endParaRPr>
+            <a:endParaRPr b="0" i="0" sz="1400" u="none" cap="none" strike="noStrike">
+              <a:solidFill>
+                <a:srgbClr val="000000"/>
+              </a:solidFill>
               <a:latin typeface="Montserrat SemiBold"/>
               <a:ea typeface="Montserrat SemiBold"/>
               <a:cs typeface="Montserrat SemiBold"/>
@@ -34257,13 +34701,12 @@
           <p:cNvPicPr preferRelativeResize="0"/>
           <p:nvPr/>
         </p:nvPicPr>
-        <p:blipFill>
+        <p:blipFill rotWithShape="1">
           <a:blip r:embed="rId5">
             <a:alphaModFix/>
           </a:blip>
-          <a:stretch>
-            <a:fillRect/>
-          </a:stretch>
+          <a:srcRect b="0" l="0" r="0" t="0"/>
+          <a:stretch/>
         </p:blipFill>
         <p:spPr>
           <a:xfrm>
@@ -34315,19 +34758,35 @@
           </a:bodyPr>
           <a:lstStyle/>
           <a:p>
-            <a:pPr indent="0" lvl="0" marL="0" rtl="0" algn="l">
-              <a:spcBef>
-                <a:spcPts val="0"/>
-              </a:spcBef>
-              <a:spcAft>
-                <a:spcPts val="0"/>
-              </a:spcAft>
+            <a:pPr indent="0" lvl="0" marL="0" marR="0" rtl="0" algn="l">
+              <a:lnSpc>
+                <a:spcPct val="100000"/>
+              </a:lnSpc>
+              <a:spcBef>
+                <a:spcPts val="0"/>
+              </a:spcBef>
+              <a:spcAft>
+                <a:spcPts val="0"/>
+              </a:spcAft>
+              <a:buClr>
+                <a:srgbClr val="000000"/>
+              </a:buClr>
+              <a:buSzPts val="1400"/>
+              <a:buFont typeface="Arial"/>
               <a:buNone/>
             </a:pPr>
             <a:r>
               <a:t/>
             </a:r>
-            <a:endParaRPr/>
+            <a:endParaRPr b="0" i="0" sz="1400" u="none" cap="none" strike="noStrike">
+              <a:solidFill>
+                <a:srgbClr val="000000"/>
+              </a:solidFill>
+              <a:latin typeface="Arial"/>
+              <a:ea typeface="Arial"/>
+              <a:cs typeface="Arial"/>
+              <a:sym typeface="Arial"/>
+            </a:endParaRPr>
           </a:p>
         </p:txBody>
       </p:sp>
@@ -34482,7 +34941,7 @@
           <a:blip r:embed="rId3">
             <a:alphaModFix/>
           </a:blip>
-          <a:srcRect b="0" l="0" r="42896" t="0"/>
+          <a:srcRect b="0" l="0" r="42895" t="0"/>
           <a:stretch/>
         </p:blipFill>
         <p:spPr>
@@ -35030,7 +35489,7 @@
       </p:grpSpPr>
       <p:sp>
         <p:nvSpPr>
-          <p:cNvPr id="186" name="Google Shape;186;gad8afea2a7_0_18"/>
+          <p:cNvPr id="186" name="Google Shape;186;gaf56e44d72_0_9"/>
           <p:cNvSpPr txBox="1"/>
           <p:nvPr>
             <p:ph idx="7" type="body"/>
@@ -35146,75 +35605,22 @@
       </p:sp>
       <p:pic>
         <p:nvPicPr>
-          <p:cNvPr id="187" name="Google Shape;187;gad8afea2a7_0_18"/>
+          <p:cNvPr id="187" name="Google Shape;187;gaf56e44d72_0_9"/>
           <p:cNvPicPr preferRelativeResize="0"/>
           <p:nvPr/>
         </p:nvPicPr>
-        <p:blipFill rotWithShape="1">
+        <p:blipFill>
           <a:blip r:embed="rId3">
             <a:alphaModFix/>
           </a:blip>
-          <a:srcRect b="0" l="52277" r="21486" t="0"/>
-          <a:stretch/>
+          <a:stretch>
+            <a:fillRect/>
+          </a:stretch>
         </p:blipFill>
         <p:spPr>
           <a:xfrm>
-            <a:off x="4519126" y="1517900"/>
-            <a:ext cx="1777150" cy="4033049"/>
-          </a:xfrm>
-          <a:prstGeom prst="rect">
-            <a:avLst/>
-          </a:prstGeom>
-          <a:noFill/>
-          <a:ln>
-            <a:noFill/>
-          </a:ln>
-        </p:spPr>
-      </p:pic>
-      <p:pic>
-        <p:nvPicPr>
-          <p:cNvPr id="188" name="Google Shape;188;gad8afea2a7_0_18"/>
-          <p:cNvPicPr preferRelativeResize="0"/>
-          <p:nvPr/>
-        </p:nvPicPr>
-        <p:blipFill rotWithShape="1">
-          <a:blip r:embed="rId4">
-            <a:alphaModFix/>
-          </a:blip>
-          <a:srcRect b="49222" l="9206" r="0" t="3674"/>
-          <a:stretch/>
-        </p:blipFill>
-        <p:spPr>
-          <a:xfrm>
-            <a:off x="221550" y="3918975"/>
-            <a:ext cx="8480824" cy="1899700"/>
-          </a:xfrm>
-          <a:prstGeom prst="rect">
-            <a:avLst/>
-          </a:prstGeom>
-          <a:noFill/>
-          <a:ln>
-            <a:noFill/>
-          </a:ln>
-        </p:spPr>
-      </p:pic>
-      <p:pic>
-        <p:nvPicPr>
-          <p:cNvPr id="189" name="Google Shape;189;gad8afea2a7_0_18"/>
-          <p:cNvPicPr preferRelativeResize="0"/>
-          <p:nvPr/>
-        </p:nvPicPr>
-        <p:blipFill rotWithShape="1">
-          <a:blip r:embed="rId5">
-            <a:alphaModFix/>
-          </a:blip>
-          <a:srcRect b="52307" l="42024" r="33589" t="588"/>
-          <a:stretch/>
-        </p:blipFill>
-        <p:spPr>
-          <a:xfrm>
-            <a:off x="8322025" y="3918975"/>
-            <a:ext cx="1362426" cy="1899700"/>
+            <a:off x="152400" y="1730200"/>
+            <a:ext cx="9601200" cy="3609210"/>
           </a:xfrm>
           <a:prstGeom prst="rect">
             <a:avLst/>
@@ -35513,6 +35919,285 @@
 </file>
 
 <file path=ppt/theme/theme2.xml><?xml version="1.0" encoding="utf-8"?>
+<a:theme xmlns:a="http://schemas.openxmlformats.org/drawingml/2006/main" xmlns:r="http://schemas.openxmlformats.org/officeDocument/2006/relationships" name="Pages contenus">
+  <a:themeElements>
+    <a:clrScheme name="ISAE Couleurs Charte">
+      <a:dk1>
+        <a:srgbClr val="000000"/>
+      </a:dk1>
+      <a:lt1>
+        <a:srgbClr val="FFFFFF"/>
+      </a:lt1>
+      <a:dk2>
+        <a:srgbClr val="929395"/>
+      </a:dk2>
+      <a:lt2>
+        <a:srgbClr val="B1B3B4"/>
+      </a:lt2>
+      <a:accent1>
+        <a:srgbClr val="00AAFF"/>
+      </a:accent1>
+      <a:accent2>
+        <a:srgbClr val="FFED00"/>
+      </a:accent2>
+      <a:accent3>
+        <a:srgbClr val="122372"/>
+      </a:accent3>
+      <a:accent4>
+        <a:srgbClr val="F8B11C"/>
+      </a:accent4>
+      <a:accent5>
+        <a:srgbClr val="9A141B"/>
+      </a:accent5>
+      <a:accent6>
+        <a:srgbClr val="26B0A0"/>
+      </a:accent6>
+      <a:hlink>
+        <a:srgbClr val="97BF0D"/>
+      </a:hlink>
+      <a:folHlink>
+        <a:srgbClr val="B67F87"/>
+      </a:folHlink>
+    </a:clrScheme>
+    <a:fontScheme name="Office">
+      <a:majorFont>
+        <a:latin typeface="Arial"/>
+        <a:ea typeface=""/>
+        <a:cs typeface=""/>
+        <a:font script="Jpan" typeface="ＭＳ Ｐゴシック"/>
+        <a:font script="Hang" typeface="맑은 고딕"/>
+        <a:font script="Hans" typeface="宋体"/>
+        <a:font script="Hant" typeface="新細明體"/>
+        <a:font script="Arab" typeface="Times New Roman"/>
+        <a:font script="Hebr" typeface="Times New Roman"/>
+        <a:font script="Thai" typeface="Angsana New"/>
+        <a:font script="Ethi" typeface="Nyala"/>
+        <a:font script="Beng" typeface="Vrinda"/>
+        <a:font script="Gujr" typeface="Shruti"/>
+        <a:font script="Khmr" typeface="MoolBoran"/>
+        <a:font script="Knda" typeface="Tunga"/>
+        <a:font script="Guru" typeface="Raavi"/>
+        <a:font script="Cans" typeface="Euphemia"/>
+        <a:font script="Cher" typeface="Plantagenet Cherokee"/>
+        <a:font script="Yiii" typeface="Microsoft Yi Baiti"/>
+        <a:font script="Tibt" typeface="Microsoft Himalaya"/>
+        <a:font script="Thaa" typeface="MV Boli"/>
+        <a:font script="Deva" typeface="Mangal"/>
+        <a:font script="Telu" typeface="Gautami"/>
+        <a:font script="Taml" typeface="Latha"/>
+        <a:font script="Syrc" typeface="Estrangelo Edessa"/>
+        <a:font script="Orya" typeface="Kalinga"/>
+        <a:font script="Mlym" typeface="Kartika"/>
+        <a:font script="Laoo" typeface="DokChampa"/>
+        <a:font script="Sinh" typeface="Iskoola Pota"/>
+        <a:font script="Mong" typeface="Mongolian Baiti"/>
+        <a:font script="Viet" typeface="Times New Roman"/>
+        <a:font script="Uigh" typeface="Microsoft Uighur"/>
+        <a:font script="Geor" typeface="Sylfaen"/>
+      </a:majorFont>
+      <a:minorFont>
+        <a:latin typeface="Arial"/>
+        <a:ea typeface=""/>
+        <a:cs typeface=""/>
+        <a:font script="Jpan" typeface="ＭＳ Ｐゴシック"/>
+        <a:font script="Hang" typeface="맑은 고딕"/>
+        <a:font script="Hans" typeface="宋体"/>
+        <a:font script="Hant" typeface="新細明體"/>
+        <a:font script="Arab" typeface="Arial"/>
+        <a:font script="Hebr" typeface="Arial"/>
+        <a:font script="Thai" typeface="Cordia New"/>
+        <a:font script="Ethi" typeface="Nyala"/>
+        <a:font script="Beng" typeface="Vrinda"/>
+        <a:font script="Gujr" typeface="Shruti"/>
+        <a:font script="Khmr" typeface="DaunPenh"/>
+        <a:font script="Knda" typeface="Tunga"/>
+        <a:font script="Guru" typeface="Raavi"/>
+        <a:font script="Cans" typeface="Euphemia"/>
+        <a:font script="Cher" typeface="Plantagenet Cherokee"/>
+        <a:font script="Yiii" typeface="Microsoft Yi Baiti"/>
+        <a:font script="Tibt" typeface="Microsoft Himalaya"/>
+        <a:font script="Thaa" typeface="MV Boli"/>
+        <a:font script="Deva" typeface="Mangal"/>
+        <a:font script="Telu" typeface="Gautami"/>
+        <a:font script="Taml" typeface="Latha"/>
+        <a:font script="Syrc" typeface="Estrangelo Edessa"/>
+        <a:font script="Orya" typeface="Kalinga"/>
+        <a:font script="Mlym" typeface="Kartika"/>
+        <a:font script="Laoo" typeface="DokChampa"/>
+        <a:font script="Sinh" typeface="Iskoola Pota"/>
+        <a:font script="Mong" typeface="Mongolian Baiti"/>
+        <a:font script="Viet" typeface="Arial"/>
+        <a:font script="Uigh" typeface="Microsoft Uighur"/>
+        <a:font script="Geor" typeface="Sylfaen"/>
+      </a:minorFont>
+    </a:fontScheme>
+    <a:fmtScheme name="Office">
+      <a:fillStyleLst>
+        <a:solidFill>
+          <a:schemeClr val="phClr"/>
+        </a:solidFill>
+        <a:gradFill rotWithShape="1">
+          <a:gsLst>
+            <a:gs pos="0">
+              <a:schemeClr val="phClr">
+                <a:tint val="50000"/>
+                <a:satMod val="300000"/>
+              </a:schemeClr>
+            </a:gs>
+            <a:gs pos="35000">
+              <a:schemeClr val="phClr">
+                <a:tint val="37000"/>
+                <a:satMod val="300000"/>
+              </a:schemeClr>
+            </a:gs>
+            <a:gs pos="100000">
+              <a:schemeClr val="phClr">
+                <a:tint val="15000"/>
+                <a:satMod val="350000"/>
+              </a:schemeClr>
+            </a:gs>
+          </a:gsLst>
+          <a:lin ang="16200000" scaled="1"/>
+        </a:gradFill>
+        <a:gradFill rotWithShape="1">
+          <a:gsLst>
+            <a:gs pos="0">
+              <a:schemeClr val="phClr">
+                <a:tint val="100000"/>
+                <a:shade val="100000"/>
+                <a:satMod val="130000"/>
+              </a:schemeClr>
+            </a:gs>
+            <a:gs pos="100000">
+              <a:schemeClr val="phClr">
+                <a:tint val="50000"/>
+                <a:shade val="100000"/>
+                <a:satMod val="350000"/>
+              </a:schemeClr>
+            </a:gs>
+          </a:gsLst>
+          <a:lin ang="16200000" scaled="0"/>
+        </a:gradFill>
+      </a:fillStyleLst>
+      <a:lnStyleLst>
+        <a:ln w="9525" cap="flat" cmpd="sng" algn="ctr">
+          <a:solidFill>
+            <a:schemeClr val="phClr">
+              <a:shade val="95000"/>
+              <a:satMod val="105000"/>
+            </a:schemeClr>
+          </a:solidFill>
+          <a:prstDash val="solid"/>
+        </a:ln>
+        <a:ln w="25400" cap="flat" cmpd="sng" algn="ctr">
+          <a:solidFill>
+            <a:schemeClr val="phClr"/>
+          </a:solidFill>
+          <a:prstDash val="solid"/>
+        </a:ln>
+        <a:ln w="38100" cap="flat" cmpd="sng" algn="ctr">
+          <a:solidFill>
+            <a:schemeClr val="phClr"/>
+          </a:solidFill>
+          <a:prstDash val="solid"/>
+        </a:ln>
+      </a:lnStyleLst>
+      <a:effectStyleLst>
+        <a:effectStyle>
+          <a:effectLst>
+            <a:outerShdw blurRad="40000" dist="20000" dir="5400000" rotWithShape="0">
+              <a:srgbClr val="000000">
+                <a:alpha val="38000"/>
+              </a:srgbClr>
+            </a:outerShdw>
+          </a:effectLst>
+        </a:effectStyle>
+        <a:effectStyle>
+          <a:effectLst>
+            <a:outerShdw blurRad="40000" dist="23000" dir="5400000" rotWithShape="0">
+              <a:srgbClr val="000000">
+                <a:alpha val="35000"/>
+              </a:srgbClr>
+            </a:outerShdw>
+          </a:effectLst>
+        </a:effectStyle>
+        <a:effectStyle>
+          <a:effectLst>
+            <a:outerShdw blurRad="40000" dist="23000" dir="5400000" rotWithShape="0">
+              <a:srgbClr val="000000">
+                <a:alpha val="35000"/>
+              </a:srgbClr>
+            </a:outerShdw>
+          </a:effectLst>
+          <a:scene3d>
+            <a:camera prst="orthographicFront">
+              <a:rot lat="0" lon="0" rev="0"/>
+            </a:camera>
+            <a:lightRig rig="threePt" dir="t">
+              <a:rot lat="0" lon="0" rev="1200000"/>
+            </a:lightRig>
+          </a:scene3d>
+          <a:sp3d>
+            <a:bevelT w="63500" h="25400"/>
+          </a:sp3d>
+        </a:effectStyle>
+      </a:effectStyleLst>
+      <a:bgFillStyleLst>
+        <a:solidFill>
+          <a:schemeClr val="phClr"/>
+        </a:solidFill>
+        <a:gradFill rotWithShape="1">
+          <a:gsLst>
+            <a:gs pos="0">
+              <a:schemeClr val="phClr">
+                <a:tint val="40000"/>
+                <a:satMod val="350000"/>
+              </a:schemeClr>
+            </a:gs>
+            <a:gs pos="40000">
+              <a:schemeClr val="phClr">
+                <a:tint val="45000"/>
+                <a:shade val="99000"/>
+                <a:satMod val="350000"/>
+              </a:schemeClr>
+            </a:gs>
+            <a:gs pos="100000">
+              <a:schemeClr val="phClr">
+                <a:shade val="20000"/>
+                <a:satMod val="255000"/>
+              </a:schemeClr>
+            </a:gs>
+          </a:gsLst>
+          <a:path path="circle">
+            <a:fillToRect l="50000" t="-80000" r="50000" b="180000"/>
+          </a:path>
+        </a:gradFill>
+        <a:gradFill rotWithShape="1">
+          <a:gsLst>
+            <a:gs pos="0">
+              <a:schemeClr val="phClr">
+                <a:tint val="80000"/>
+                <a:satMod val="300000"/>
+              </a:schemeClr>
+            </a:gs>
+            <a:gs pos="100000">
+              <a:schemeClr val="phClr">
+                <a:shade val="30000"/>
+                <a:satMod val="200000"/>
+              </a:schemeClr>
+            </a:gs>
+          </a:gsLst>
+          <a:path path="circle">
+            <a:fillToRect l="50000" t="50000" r="50000" b="50000"/>
+          </a:path>
+        </a:gradFill>
+      </a:bgFillStyleLst>
+    </a:fmtScheme>
+  </a:themeElements>
+</a:theme>
+</file>
+
+<file path=ppt/theme/theme3.xml><?xml version="1.0" encoding="utf-8"?>
 <a:theme xmlns:a="http://schemas.openxmlformats.org/drawingml/2006/main" xmlns:r="http://schemas.openxmlformats.org/officeDocument/2006/relationships" name="Thème Office">
   <a:themeElements>
     <a:clrScheme name="Bureau">
@@ -35789,283 +36474,4 @@
     </a:fmtScheme>
   </a:themeElements>
 </a:theme>
-</file>
-
-<file path=ppt/theme/theme3.xml><?xml version="1.0" encoding="utf-8"?>
-<a:theme xmlns:a="http://schemas.openxmlformats.org/drawingml/2006/main" xmlns:r="http://schemas.openxmlformats.org/officeDocument/2006/relationships" name="Pages contenus">
-  <a:themeElements>
-    <a:clrScheme name="ISAE Couleurs Charte">
-      <a:dk1>
-        <a:srgbClr val="000000"/>
-      </a:dk1>
-      <a:lt1>
-        <a:srgbClr val="FFFFFF"/>
-      </a:lt1>
-      <a:dk2>
-        <a:srgbClr val="929395"/>
-      </a:dk2>
-      <a:lt2>
-        <a:srgbClr val="B1B3B4"/>
-      </a:lt2>
-      <a:accent1>
-        <a:srgbClr val="00AAFF"/>
-      </a:accent1>
-      <a:accent2>
-        <a:srgbClr val="FFED00"/>
-      </a:accent2>
-      <a:accent3>
-        <a:srgbClr val="122372"/>
-      </a:accent3>
-      <a:accent4>
-        <a:srgbClr val="F8B11C"/>
-      </a:accent4>
-      <a:accent5>
-        <a:srgbClr val="9A141B"/>
-      </a:accent5>
-      <a:accent6>
-        <a:srgbClr val="26B0A0"/>
-      </a:accent6>
-      <a:hlink>
-        <a:srgbClr val="97BF0D"/>
-      </a:hlink>
-      <a:folHlink>
-        <a:srgbClr val="B67F87"/>
-      </a:folHlink>
-    </a:clrScheme>
-    <a:fontScheme name="Office">
-      <a:majorFont>
-        <a:latin typeface="Arial"/>
-        <a:ea typeface=""/>
-        <a:cs typeface=""/>
-        <a:font script="Jpan" typeface="ＭＳ Ｐゴシック"/>
-        <a:font script="Hang" typeface="맑은 고딕"/>
-        <a:font script="Hans" typeface="宋体"/>
-        <a:font script="Hant" typeface="新細明體"/>
-        <a:font script="Arab" typeface="Times New Roman"/>
-        <a:font script="Hebr" typeface="Times New Roman"/>
-        <a:font script="Thai" typeface="Angsana New"/>
-        <a:font script="Ethi" typeface="Nyala"/>
-        <a:font script="Beng" typeface="Vrinda"/>
-        <a:font script="Gujr" typeface="Shruti"/>
-        <a:font script="Khmr" typeface="MoolBoran"/>
-        <a:font script="Knda" typeface="Tunga"/>
-        <a:font script="Guru" typeface="Raavi"/>
-        <a:font script="Cans" typeface="Euphemia"/>
-        <a:font script="Cher" typeface="Plantagenet Cherokee"/>
-        <a:font script="Yiii" typeface="Microsoft Yi Baiti"/>
-        <a:font script="Tibt" typeface="Microsoft Himalaya"/>
-        <a:font script="Thaa" typeface="MV Boli"/>
-        <a:font script="Deva" typeface="Mangal"/>
-        <a:font script="Telu" typeface="Gautami"/>
-        <a:font script="Taml" typeface="Latha"/>
-        <a:font script="Syrc" typeface="Estrangelo Edessa"/>
-        <a:font script="Orya" typeface="Kalinga"/>
-        <a:font script="Mlym" typeface="Kartika"/>
-        <a:font script="Laoo" typeface="DokChampa"/>
-        <a:font script="Sinh" typeface="Iskoola Pota"/>
-        <a:font script="Mong" typeface="Mongolian Baiti"/>
-        <a:font script="Viet" typeface="Times New Roman"/>
-        <a:font script="Uigh" typeface="Microsoft Uighur"/>
-        <a:font script="Geor" typeface="Sylfaen"/>
-      </a:majorFont>
-      <a:minorFont>
-        <a:latin typeface="Arial"/>
-        <a:ea typeface=""/>
-        <a:cs typeface=""/>
-        <a:font script="Jpan" typeface="ＭＳ Ｐゴシック"/>
-        <a:font script="Hang" typeface="맑은 고딕"/>
-        <a:font script="Hans" typeface="宋体"/>
-        <a:font script="Hant" typeface="新細明體"/>
-        <a:font script="Arab" typeface="Arial"/>
-        <a:font script="Hebr" typeface="Arial"/>
-        <a:font script="Thai" typeface="Cordia New"/>
-        <a:font script="Ethi" typeface="Nyala"/>
-        <a:font script="Beng" typeface="Vrinda"/>
-        <a:font script="Gujr" typeface="Shruti"/>
-        <a:font script="Khmr" typeface="DaunPenh"/>
-        <a:font script="Knda" typeface="Tunga"/>
-        <a:font script="Guru" typeface="Raavi"/>
-        <a:font script="Cans" typeface="Euphemia"/>
-        <a:font script="Cher" typeface="Plantagenet Cherokee"/>
-        <a:font script="Yiii" typeface="Microsoft Yi Baiti"/>
-        <a:font script="Tibt" typeface="Microsoft Himalaya"/>
-        <a:font script="Thaa" typeface="MV Boli"/>
-        <a:font script="Deva" typeface="Mangal"/>
-        <a:font script="Telu" typeface="Gautami"/>
-        <a:font script="Taml" typeface="Latha"/>
-        <a:font script="Syrc" typeface="Estrangelo Edessa"/>
-        <a:font script="Orya" typeface="Kalinga"/>
-        <a:font script="Mlym" typeface="Kartika"/>
-        <a:font script="Laoo" typeface="DokChampa"/>
-        <a:font script="Sinh" typeface="Iskoola Pota"/>
-        <a:font script="Mong" typeface="Mongolian Baiti"/>
-        <a:font script="Viet" typeface="Arial"/>
-        <a:font script="Uigh" typeface="Microsoft Uighur"/>
-        <a:font script="Geor" typeface="Sylfaen"/>
-      </a:minorFont>
-    </a:fontScheme>
-    <a:fmtScheme name="Office">
-      <a:fillStyleLst>
-        <a:solidFill>
-          <a:schemeClr val="phClr"/>
-        </a:solidFill>
-        <a:gradFill rotWithShape="1">
-          <a:gsLst>
-            <a:gs pos="0">
-              <a:schemeClr val="phClr">
-                <a:tint val="50000"/>
-                <a:satMod val="300000"/>
-              </a:schemeClr>
-            </a:gs>
-            <a:gs pos="35000">
-              <a:schemeClr val="phClr">
-                <a:tint val="37000"/>
-                <a:satMod val="300000"/>
-              </a:schemeClr>
-            </a:gs>
-            <a:gs pos="100000">
-              <a:schemeClr val="phClr">
-                <a:tint val="15000"/>
-                <a:satMod val="350000"/>
-              </a:schemeClr>
-            </a:gs>
-          </a:gsLst>
-          <a:lin ang="16200000" scaled="1"/>
-        </a:gradFill>
-        <a:gradFill rotWithShape="1">
-          <a:gsLst>
-            <a:gs pos="0">
-              <a:schemeClr val="phClr">
-                <a:tint val="100000"/>
-                <a:shade val="100000"/>
-                <a:satMod val="130000"/>
-              </a:schemeClr>
-            </a:gs>
-            <a:gs pos="100000">
-              <a:schemeClr val="phClr">
-                <a:tint val="50000"/>
-                <a:shade val="100000"/>
-                <a:satMod val="350000"/>
-              </a:schemeClr>
-            </a:gs>
-          </a:gsLst>
-          <a:lin ang="16200000" scaled="0"/>
-        </a:gradFill>
-      </a:fillStyleLst>
-      <a:lnStyleLst>
-        <a:ln w="9525" cap="flat" cmpd="sng" algn="ctr">
-          <a:solidFill>
-            <a:schemeClr val="phClr">
-              <a:shade val="95000"/>
-              <a:satMod val="105000"/>
-            </a:schemeClr>
-          </a:solidFill>
-          <a:prstDash val="solid"/>
-        </a:ln>
-        <a:ln w="25400" cap="flat" cmpd="sng" algn="ctr">
-          <a:solidFill>
-            <a:schemeClr val="phClr"/>
-          </a:solidFill>
-          <a:prstDash val="solid"/>
-        </a:ln>
-        <a:ln w="38100" cap="flat" cmpd="sng" algn="ctr">
-          <a:solidFill>
-            <a:schemeClr val="phClr"/>
-          </a:solidFill>
-          <a:prstDash val="solid"/>
-        </a:ln>
-      </a:lnStyleLst>
-      <a:effectStyleLst>
-        <a:effectStyle>
-          <a:effectLst>
-            <a:outerShdw blurRad="40000" dist="20000" dir="5400000" rotWithShape="0">
-              <a:srgbClr val="000000">
-                <a:alpha val="38000"/>
-              </a:srgbClr>
-            </a:outerShdw>
-          </a:effectLst>
-        </a:effectStyle>
-        <a:effectStyle>
-          <a:effectLst>
-            <a:outerShdw blurRad="40000" dist="23000" dir="5400000" rotWithShape="0">
-              <a:srgbClr val="000000">
-                <a:alpha val="35000"/>
-              </a:srgbClr>
-            </a:outerShdw>
-          </a:effectLst>
-        </a:effectStyle>
-        <a:effectStyle>
-          <a:effectLst>
-            <a:outerShdw blurRad="40000" dist="23000" dir="5400000" rotWithShape="0">
-              <a:srgbClr val="000000">
-                <a:alpha val="35000"/>
-              </a:srgbClr>
-            </a:outerShdw>
-          </a:effectLst>
-          <a:scene3d>
-            <a:camera prst="orthographicFront">
-              <a:rot lat="0" lon="0" rev="0"/>
-            </a:camera>
-            <a:lightRig rig="threePt" dir="t">
-              <a:rot lat="0" lon="0" rev="1200000"/>
-            </a:lightRig>
-          </a:scene3d>
-          <a:sp3d>
-            <a:bevelT w="63500" h="25400"/>
-          </a:sp3d>
-        </a:effectStyle>
-      </a:effectStyleLst>
-      <a:bgFillStyleLst>
-        <a:solidFill>
-          <a:schemeClr val="phClr"/>
-        </a:solidFill>
-        <a:gradFill rotWithShape="1">
-          <a:gsLst>
-            <a:gs pos="0">
-              <a:schemeClr val="phClr">
-                <a:tint val="40000"/>
-                <a:satMod val="350000"/>
-              </a:schemeClr>
-            </a:gs>
-            <a:gs pos="40000">
-              <a:schemeClr val="phClr">
-                <a:tint val="45000"/>
-                <a:shade val="99000"/>
-                <a:satMod val="350000"/>
-              </a:schemeClr>
-            </a:gs>
-            <a:gs pos="100000">
-              <a:schemeClr val="phClr">
-                <a:shade val="20000"/>
-                <a:satMod val="255000"/>
-              </a:schemeClr>
-            </a:gs>
-          </a:gsLst>
-          <a:path path="circle">
-            <a:fillToRect l="50000" t="-80000" r="50000" b="180000"/>
-          </a:path>
-        </a:gradFill>
-        <a:gradFill rotWithShape="1">
-          <a:gsLst>
-            <a:gs pos="0">
-              <a:schemeClr val="phClr">
-                <a:tint val="80000"/>
-                <a:satMod val="300000"/>
-              </a:schemeClr>
-            </a:gs>
-            <a:gs pos="100000">
-              <a:schemeClr val="phClr">
-                <a:shade val="30000"/>
-                <a:satMod val="200000"/>
-              </a:schemeClr>
-            </a:gs>
-          </a:gsLst>
-          <a:path path="circle">
-            <a:fillToRect l="50000" t="50000" r="50000" b="50000"/>
-          </a:path>
-        </a:gradFill>
-      </a:bgFillStyleLst>
-    </a:fmtScheme>
-  </a:themeElements>
-</a:theme>
 </file>
</xml_diff>